<commit_message>
fix timing of the video and add updated files
</commit_message>
<xml_diff>
--- a/Tutorials/whatiswot/2-Payloads_and_Headers/2-Payloads_and_Headers.pptx
+++ b/Tutorials/whatiswot/2-Payloads_and_Headers/2-Payloads_and_Headers.pptx
@@ -345,7 +345,7 @@
             <a:fld id="{BE133555-111A-4397-9510-7D1E642AA942}" type="datetimeFigureOut">
               <a:rPr lang="en-US" smtClean="0"/>
               <a:pPr/>
-              <a:t>11/22/23</a:t>
+              <a:t>3/15/24</a:t>
             </a:fld>
             <a:endParaRPr lang="en-US" dirty="0"/>
           </a:p>
@@ -5745,7 +5745,7 @@
           <a:p>
             <a:fld id="{1ECB4361-894C-4E1E-9D40-0AFC03E55FFF}" type="datetimeFigureOut">
               <a:rPr lang="en-US" smtClean="0"/>
-              <a:t>11/22/23</a:t>
+              <a:t>3/15/24</a:t>
             </a:fld>
             <a:endParaRPr lang="en-US"/>
           </a:p>
@@ -5915,7 +5915,7 @@
           <a:p>
             <a:fld id="{1ECB4361-894C-4E1E-9D40-0AFC03E55FFF}" type="datetimeFigureOut">
               <a:rPr lang="en-US" smtClean="0"/>
-              <a:t>11/22/23</a:t>
+              <a:t>3/15/24</a:t>
             </a:fld>
             <a:endParaRPr lang="en-US"/>
           </a:p>
@@ -6095,7 +6095,7 @@
           <a:p>
             <a:fld id="{1ECB4361-894C-4E1E-9D40-0AFC03E55FFF}" type="datetimeFigureOut">
               <a:rPr lang="en-US" smtClean="0"/>
-              <a:t>11/22/23</a:t>
+              <a:t>3/15/24</a:t>
             </a:fld>
             <a:endParaRPr lang="en-US"/>
           </a:p>
@@ -6265,7 +6265,7 @@
           <a:p>
             <a:fld id="{1ECB4361-894C-4E1E-9D40-0AFC03E55FFF}" type="datetimeFigureOut">
               <a:rPr lang="en-US" smtClean="0"/>
-              <a:t>11/22/23</a:t>
+              <a:t>3/15/24</a:t>
             </a:fld>
             <a:endParaRPr lang="en-US"/>
           </a:p>
@@ -6511,7 +6511,7 @@
           <a:p>
             <a:fld id="{1ECB4361-894C-4E1E-9D40-0AFC03E55FFF}" type="datetimeFigureOut">
               <a:rPr lang="en-US" smtClean="0"/>
-              <a:t>11/22/23</a:t>
+              <a:t>3/15/24</a:t>
             </a:fld>
             <a:endParaRPr lang="en-US"/>
           </a:p>
@@ -6743,7 +6743,7 @@
           <a:p>
             <a:fld id="{1ECB4361-894C-4E1E-9D40-0AFC03E55FFF}" type="datetimeFigureOut">
               <a:rPr lang="en-US" smtClean="0"/>
-              <a:t>11/22/23</a:t>
+              <a:t>3/15/24</a:t>
             </a:fld>
             <a:endParaRPr lang="en-US"/>
           </a:p>
@@ -7110,7 +7110,7 @@
           <a:p>
             <a:fld id="{1ECB4361-894C-4E1E-9D40-0AFC03E55FFF}" type="datetimeFigureOut">
               <a:rPr lang="en-US" smtClean="0"/>
-              <a:t>11/22/23</a:t>
+              <a:t>3/15/24</a:t>
             </a:fld>
             <a:endParaRPr lang="en-US"/>
           </a:p>
@@ -7228,7 +7228,7 @@
           <a:p>
             <a:fld id="{1ECB4361-894C-4E1E-9D40-0AFC03E55FFF}" type="datetimeFigureOut">
               <a:rPr lang="en-US" smtClean="0"/>
-              <a:t>11/22/23</a:t>
+              <a:t>3/15/24</a:t>
             </a:fld>
             <a:endParaRPr lang="en-US"/>
           </a:p>
@@ -7323,7 +7323,7 @@
           <a:p>
             <a:fld id="{1ECB4361-894C-4E1E-9D40-0AFC03E55FFF}" type="datetimeFigureOut">
               <a:rPr lang="en-US" smtClean="0"/>
-              <a:t>11/22/23</a:t>
+              <a:t>3/15/24</a:t>
             </a:fld>
             <a:endParaRPr lang="en-US"/>
           </a:p>
@@ -7600,7 +7600,7 @@
           <a:p>
             <a:fld id="{1ECB4361-894C-4E1E-9D40-0AFC03E55FFF}" type="datetimeFigureOut">
               <a:rPr lang="en-US" smtClean="0"/>
-              <a:t>11/22/23</a:t>
+              <a:t>3/15/24</a:t>
             </a:fld>
             <a:endParaRPr lang="en-US"/>
           </a:p>
@@ -7857,7 +7857,7 @@
           <a:p>
             <a:fld id="{1ECB4361-894C-4E1E-9D40-0AFC03E55FFF}" type="datetimeFigureOut">
               <a:rPr lang="en-US" smtClean="0"/>
-              <a:t>11/22/23</a:t>
+              <a:t>3/15/24</a:t>
             </a:fld>
             <a:endParaRPr lang="en-US"/>
           </a:p>
@@ -8076,7 +8076,7 @@
             <a:fld id="{1ECB4361-894C-4E1E-9D40-0AFC03E55FFF}" type="datetimeFigureOut">
               <a:rPr lang="en-US" smtClean="0"/>
               <a:pPr/>
-              <a:t>11/22/23</a:t>
+              <a:t>3/15/24</a:t>
             </a:fld>
             <a:endParaRPr lang="en-US" dirty="0"/>
           </a:p>
@@ -10900,14 +10900,14 @@
   <p:clrMapOvr>
     <a:masterClrMapping/>
   </p:clrMapOvr>
-  <mc:AlternateContent xmlns:mc="http://schemas.openxmlformats.org/markup-compatibility/2006" xmlns:p159="http://schemas.microsoft.com/office/powerpoint/2015/09/main">
-    <mc:Choice Requires="p159">
-      <p:transition xmlns:p14="http://schemas.microsoft.com/office/powerpoint/2010/main" spd="slow" p14:dur="2000" advTm="4000">
+  <mc:AlternateContent xmlns:mc="http://schemas.openxmlformats.org/markup-compatibility/2006">
+    <mc:Choice xmlns:p159="http://schemas.microsoft.com/office/powerpoint/2015/09/main" Requires="p159">
+      <p:transition xmlns:p14="http://schemas.microsoft.com/office/powerpoint/2010/main" spd="slow" p14:dur="2000" advTm="3000">
         <p159:morph option="byObject"/>
       </p:transition>
     </mc:Choice>
-    <mc:Fallback xmlns="">
-      <p:transition spd="slow" advTm="4000">
+    <mc:Fallback>
+      <p:transition spd="slow" advTm="3000">
         <p:fade/>
       </p:transition>
     </mc:Fallback>
@@ -11299,14 +11299,14 @@
   <p:clrMapOvr>
     <a:masterClrMapping/>
   </p:clrMapOvr>
-  <mc:AlternateContent xmlns:mc="http://schemas.openxmlformats.org/markup-compatibility/2006" xmlns:p159="http://schemas.microsoft.com/office/powerpoint/2015/09/main">
-    <mc:Choice Requires="p159">
-      <p:transition xmlns:p14="http://schemas.microsoft.com/office/powerpoint/2010/main" spd="slow" p14:dur="2000" advTm="3000">
+  <mc:AlternateContent xmlns:mc="http://schemas.openxmlformats.org/markup-compatibility/2006">
+    <mc:Choice xmlns:p159="http://schemas.microsoft.com/office/powerpoint/2015/09/main" Requires="p159">
+      <p:transition xmlns:p14="http://schemas.microsoft.com/office/powerpoint/2010/main" spd="slow" p14:dur="2000" advTm="4000">
         <p159:morph option="byObject"/>
       </p:transition>
     </mc:Choice>
-    <mc:Fallback xmlns="">
-      <p:transition spd="slow" advTm="3000">
+    <mc:Fallback>
+      <p:transition spd="slow" advTm="4000">
         <p:fade/>
       </p:transition>
     </mc:Fallback>
@@ -11805,13 +11805,13 @@
   <p:clrMapOvr>
     <a:masterClrMapping/>
   </p:clrMapOvr>
-  <mc:AlternateContent xmlns:mc="http://schemas.openxmlformats.org/markup-compatibility/2006" xmlns:p159="http://schemas.microsoft.com/office/powerpoint/2015/09/main">
-    <mc:Choice Requires="p159">
+  <mc:AlternateContent xmlns:mc="http://schemas.openxmlformats.org/markup-compatibility/2006">
+    <mc:Choice xmlns:p159="http://schemas.microsoft.com/office/powerpoint/2015/09/main" Requires="p159">
       <p:transition spd="slow" advTm="11000">
         <p159:morph option="byObject"/>
       </p:transition>
     </mc:Choice>
-    <mc:Fallback xmlns="">
+    <mc:Fallback>
       <p:transition spd="slow" advTm="11000">
         <p:fade/>
       </p:transition>
@@ -34244,13 +34244,13 @@
   <p:clrMapOvr>
     <a:masterClrMapping/>
   </p:clrMapOvr>
-  <mc:AlternateContent xmlns:mc="http://schemas.openxmlformats.org/markup-compatibility/2006">
-    <mc:Choice xmlns:p159="http://schemas.microsoft.com/office/powerpoint/2015/09/main" Requires="p159">
+  <mc:AlternateContent xmlns:mc="http://schemas.openxmlformats.org/markup-compatibility/2006" xmlns:p159="http://schemas.microsoft.com/office/powerpoint/2015/09/main">
+    <mc:Choice Requires="p159">
       <p:transition xmlns:p14="http://schemas.microsoft.com/office/powerpoint/2010/main" spd="slow" p14:dur="2000" advTm="4000">
         <p159:morph option="byObject"/>
       </p:transition>
     </mc:Choice>
-    <mc:Fallback>
+    <mc:Fallback xmlns="">
       <p:transition spd="slow" advTm="4000">
         <p:fade/>
       </p:transition>
@@ -34512,11 +34512,11 @@
   <p:clrMapOvr>
     <a:masterClrMapping/>
   </p:clrMapOvr>
-  <mc:AlternateContent xmlns:mc="http://schemas.openxmlformats.org/markup-compatibility/2006">
-    <mc:Choice xmlns:p14="http://schemas.microsoft.com/office/powerpoint/2010/main" Requires="p14">
+  <mc:AlternateContent xmlns:mc="http://schemas.openxmlformats.org/markup-compatibility/2006" xmlns:p14="http://schemas.microsoft.com/office/powerpoint/2010/main">
+    <mc:Choice Requires="p14">
       <p:transition spd="slow" p14:dur="3000" advClick="0" advTm="4700"/>
     </mc:Choice>
-    <mc:Fallback>
+    <mc:Fallback xmlns="">
       <p:transition spd="slow" advClick="0" advTm="4700"/>
     </mc:Fallback>
   </mc:AlternateContent>
@@ -36876,14 +36876,14 @@
   <p:clrMapOvr>
     <a:masterClrMapping/>
   </p:clrMapOvr>
-  <mc:AlternateContent xmlns:mc="http://schemas.openxmlformats.org/markup-compatibility/2006" xmlns:p159="http://schemas.microsoft.com/office/powerpoint/2015/09/main">
-    <mc:Choice Requires="p159">
-      <p:transition xmlns:p14="http://schemas.microsoft.com/office/powerpoint/2010/main" spd="slow" p14:dur="2000" advTm="1000">
+  <mc:AlternateContent xmlns:mc="http://schemas.openxmlformats.org/markup-compatibility/2006">
+    <mc:Choice xmlns:p159="http://schemas.microsoft.com/office/powerpoint/2015/09/main" Requires="p159">
+      <p:transition xmlns:p14="http://schemas.microsoft.com/office/powerpoint/2010/main" spd="slow" p14:dur="2000" advTm="0">
         <p159:morph option="byObject"/>
       </p:transition>
     </mc:Choice>
-    <mc:Fallback xmlns="">
-      <p:transition spd="slow" advTm="1000">
+    <mc:Fallback>
+      <p:transition spd="slow" advTm="0">
         <p:fade/>
       </p:transition>
     </mc:Fallback>

</xml_diff>

<commit_message>
applied minor fixes to the video
</commit_message>
<xml_diff>
--- a/Tutorials/whatiswot/2-Payloads_and_Headers/2-Payloads_and_Headers.pptx
+++ b/Tutorials/whatiswot/2-Payloads_and_Headers/2-Payloads_and_Headers.pptx
@@ -345,7 +345,7 @@
             <a:fld id="{BE133555-111A-4397-9510-7D1E642AA942}" type="datetimeFigureOut">
               <a:rPr lang="en-US" smtClean="0"/>
               <a:pPr/>
-              <a:t>3/15/24</a:t>
+              <a:t>7/5/24</a:t>
             </a:fld>
             <a:endParaRPr lang="en-US" dirty="0"/>
           </a:p>
@@ -2228,85 +2228,9 @@
                 <a:effectLst/>
                 <a:latin typeface="Roboto" panose="02000000000000000000" pitchFamily="2" charset="0"/>
               </a:rPr>
-              <a:t>This is an introductory series that presents technologies and standards relevant to the Web of Things. If you want to skip directly to the tutorials on the W3C Web of Things standards, click the link in the video description.</a:t>
+              <a:t>This is an introductory series that presents technologies and standards relevant to the Web of Things. If you want to skip directly to the tutorials on the W3C Web of Things standards, click the link in the video description to reach our website.</a:t>
             </a:r>
             <a:endParaRPr lang="tr-TR" b="0" i="0" dirty="0">
-              <a:solidFill>
-                <a:srgbClr val="FF0000"/>
-              </a:solidFill>
-              <a:effectLst/>
-              <a:latin typeface="Roboto" panose="02000000000000000000" pitchFamily="2" charset="0"/>
-            </a:endParaRPr>
-          </a:p>
-          <a:p>
-            <a:pPr marL="0" marR="0" lvl="0" indent="0" algn="l" defTabSz="914400" rtl="0" eaLnBrk="1" fontAlgn="auto" latinLnBrk="0" hangingPunct="1">
-              <a:lnSpc>
-                <a:spcPct val="100000"/>
-              </a:lnSpc>
-              <a:spcBef>
-                <a:spcPts val="0"/>
-              </a:spcBef>
-              <a:spcAft>
-                <a:spcPts val="0"/>
-              </a:spcAft>
-              <a:buClrTx/>
-              <a:buSzTx/>
-              <a:buFontTx/>
-              <a:buNone/>
-              <a:tabLst/>
-              <a:defRPr/>
-            </a:pPr>
-            <a:r>
-              <a:rPr lang="tr-TR" b="0" i="0" dirty="0">
-                <a:solidFill>
-                  <a:srgbClr val="FF0000"/>
-                </a:solidFill>
-                <a:effectLst/>
-                <a:latin typeface="Roboto" panose="02000000000000000000" pitchFamily="2" charset="0"/>
-              </a:rPr>
-              <a:t>Intro of the </a:t>
-            </a:r>
-            <a:r>
-              <a:rPr lang="tr-TR" b="0" i="0" dirty="0" err="1">
-                <a:solidFill>
-                  <a:srgbClr val="FF0000"/>
-                </a:solidFill>
-                <a:effectLst/>
-                <a:latin typeface="Roboto" panose="02000000000000000000" pitchFamily="2" charset="0"/>
-              </a:rPr>
-              <a:t>all</a:t>
-            </a:r>
-            <a:r>
-              <a:rPr lang="tr-TR" b="0" i="0" dirty="0">
-                <a:solidFill>
-                  <a:srgbClr val="FF0000"/>
-                </a:solidFill>
-                <a:effectLst/>
-                <a:latin typeface="Roboto" panose="02000000000000000000" pitchFamily="2" charset="0"/>
-              </a:rPr>
-              <a:t> </a:t>
-            </a:r>
-            <a:r>
-              <a:rPr lang="tr-TR" b="0" i="0" dirty="0" err="1">
-                <a:solidFill>
-                  <a:srgbClr val="FF0000"/>
-                </a:solidFill>
-                <a:effectLst/>
-                <a:latin typeface="Roboto" panose="02000000000000000000" pitchFamily="2" charset="0"/>
-              </a:rPr>
-              <a:t>concepts</a:t>
-            </a:r>
-            <a:r>
-              <a:rPr lang="tr-TR" b="0" i="0" dirty="0">
-                <a:solidFill>
-                  <a:srgbClr val="FF0000"/>
-                </a:solidFill>
-                <a:effectLst/>
-                <a:latin typeface="Roboto" panose="02000000000000000000" pitchFamily="2" charset="0"/>
-              </a:rPr>
-              <a:t>.</a:t>
-            </a:r>
-            <a:endParaRPr lang="en-US" b="0" i="0" dirty="0">
               <a:solidFill>
                 <a:srgbClr val="FF0000"/>
               </a:solidFill>
@@ -3967,21 +3891,16 @@
               <a:t>in JSON. </a:t>
             </a:r>
             <a:r>
-              <a:rPr lang="tr-TR" dirty="0"/>
-              <a:t>Also, m</a:t>
-            </a:r>
-            <a:r>
-              <a:rPr lang="en-US" dirty="0"/>
-              <a:t>any </a:t>
-            </a:r>
-            <a:r>
-              <a:rPr lang="tr-TR" dirty="0"/>
-              <a:t>other </a:t>
-            </a:r>
-            <a:r>
-              <a:rPr lang="en-US" dirty="0"/>
-              <a:t>API and configuration files use JSON.</a:t>
-            </a:r>
+              <a:rPr lang="en-US" b="0" i="0" dirty="0">
+                <a:solidFill>
+                  <a:srgbClr val="1F2328"/>
+                </a:solidFill>
+                <a:effectLst/>
+                <a:latin typeface="-apple-system"/>
+              </a:rPr>
+              <a:t>Also, the core standard Thing Description, as well as many other API and configuration files use JSON.</a:t>
+            </a:r>
+            <a:endParaRPr lang="en-US" dirty="0"/>
           </a:p>
         </p:txBody>
       </p:sp>
@@ -5745,7 +5664,7 @@
           <a:p>
             <a:fld id="{1ECB4361-894C-4E1E-9D40-0AFC03E55FFF}" type="datetimeFigureOut">
               <a:rPr lang="en-US" smtClean="0"/>
-              <a:t>3/15/24</a:t>
+              <a:t>7/5/24</a:t>
             </a:fld>
             <a:endParaRPr lang="en-US"/>
           </a:p>
@@ -5915,7 +5834,7 @@
           <a:p>
             <a:fld id="{1ECB4361-894C-4E1E-9D40-0AFC03E55FFF}" type="datetimeFigureOut">
               <a:rPr lang="en-US" smtClean="0"/>
-              <a:t>3/15/24</a:t>
+              <a:t>7/5/24</a:t>
             </a:fld>
             <a:endParaRPr lang="en-US"/>
           </a:p>
@@ -6095,7 +6014,7 @@
           <a:p>
             <a:fld id="{1ECB4361-894C-4E1E-9D40-0AFC03E55FFF}" type="datetimeFigureOut">
               <a:rPr lang="en-US" smtClean="0"/>
-              <a:t>3/15/24</a:t>
+              <a:t>7/5/24</a:t>
             </a:fld>
             <a:endParaRPr lang="en-US"/>
           </a:p>
@@ -6265,7 +6184,7 @@
           <a:p>
             <a:fld id="{1ECB4361-894C-4E1E-9D40-0AFC03E55FFF}" type="datetimeFigureOut">
               <a:rPr lang="en-US" smtClean="0"/>
-              <a:t>3/15/24</a:t>
+              <a:t>7/5/24</a:t>
             </a:fld>
             <a:endParaRPr lang="en-US"/>
           </a:p>
@@ -6511,7 +6430,7 @@
           <a:p>
             <a:fld id="{1ECB4361-894C-4E1E-9D40-0AFC03E55FFF}" type="datetimeFigureOut">
               <a:rPr lang="en-US" smtClean="0"/>
-              <a:t>3/15/24</a:t>
+              <a:t>7/5/24</a:t>
             </a:fld>
             <a:endParaRPr lang="en-US"/>
           </a:p>
@@ -6743,7 +6662,7 @@
           <a:p>
             <a:fld id="{1ECB4361-894C-4E1E-9D40-0AFC03E55FFF}" type="datetimeFigureOut">
               <a:rPr lang="en-US" smtClean="0"/>
-              <a:t>3/15/24</a:t>
+              <a:t>7/5/24</a:t>
             </a:fld>
             <a:endParaRPr lang="en-US"/>
           </a:p>
@@ -7110,7 +7029,7 @@
           <a:p>
             <a:fld id="{1ECB4361-894C-4E1E-9D40-0AFC03E55FFF}" type="datetimeFigureOut">
               <a:rPr lang="en-US" smtClean="0"/>
-              <a:t>3/15/24</a:t>
+              <a:t>7/5/24</a:t>
             </a:fld>
             <a:endParaRPr lang="en-US"/>
           </a:p>
@@ -7228,7 +7147,7 @@
           <a:p>
             <a:fld id="{1ECB4361-894C-4E1E-9D40-0AFC03E55FFF}" type="datetimeFigureOut">
               <a:rPr lang="en-US" smtClean="0"/>
-              <a:t>3/15/24</a:t>
+              <a:t>7/5/24</a:t>
             </a:fld>
             <a:endParaRPr lang="en-US"/>
           </a:p>
@@ -7323,7 +7242,7 @@
           <a:p>
             <a:fld id="{1ECB4361-894C-4E1E-9D40-0AFC03E55FFF}" type="datetimeFigureOut">
               <a:rPr lang="en-US" smtClean="0"/>
-              <a:t>3/15/24</a:t>
+              <a:t>7/5/24</a:t>
             </a:fld>
             <a:endParaRPr lang="en-US"/>
           </a:p>
@@ -7600,7 +7519,7 @@
           <a:p>
             <a:fld id="{1ECB4361-894C-4E1E-9D40-0AFC03E55FFF}" type="datetimeFigureOut">
               <a:rPr lang="en-US" smtClean="0"/>
-              <a:t>3/15/24</a:t>
+              <a:t>7/5/24</a:t>
             </a:fld>
             <a:endParaRPr lang="en-US"/>
           </a:p>
@@ -7857,7 +7776,7 @@
           <a:p>
             <a:fld id="{1ECB4361-894C-4E1E-9D40-0AFC03E55FFF}" type="datetimeFigureOut">
               <a:rPr lang="en-US" smtClean="0"/>
-              <a:t>3/15/24</a:t>
+              <a:t>7/5/24</a:t>
             </a:fld>
             <a:endParaRPr lang="en-US"/>
           </a:p>
@@ -8076,7 +7995,7 @@
             <a:fld id="{1ECB4361-894C-4E1E-9D40-0AFC03E55FFF}" type="datetimeFigureOut">
               <a:rPr lang="en-US" smtClean="0"/>
               <a:pPr/>
-              <a:t>3/15/24</a:t>
+              <a:t>7/5/24</a:t>
             </a:fld>
             <a:endParaRPr lang="en-US" dirty="0"/>
           </a:p>
@@ -10900,13 +10819,13 @@
   <p:clrMapOvr>
     <a:masterClrMapping/>
   </p:clrMapOvr>
-  <mc:AlternateContent xmlns:mc="http://schemas.openxmlformats.org/markup-compatibility/2006">
-    <mc:Choice xmlns:p159="http://schemas.microsoft.com/office/powerpoint/2015/09/main" Requires="p159">
+  <mc:AlternateContent xmlns:mc="http://schemas.openxmlformats.org/markup-compatibility/2006" xmlns:p159="http://schemas.microsoft.com/office/powerpoint/2015/09/main">
+    <mc:Choice Requires="p159">
       <p:transition xmlns:p14="http://schemas.microsoft.com/office/powerpoint/2010/main" spd="slow" p14:dur="2000" advTm="3000">
         <p159:morph option="byObject"/>
       </p:transition>
     </mc:Choice>
-    <mc:Fallback>
+    <mc:Fallback xmlns="">
       <p:transition spd="slow" advTm="3000">
         <p:fade/>
       </p:transition>
@@ -11299,13 +11218,13 @@
   <p:clrMapOvr>
     <a:masterClrMapping/>
   </p:clrMapOvr>
-  <mc:AlternateContent xmlns:mc="http://schemas.openxmlformats.org/markup-compatibility/2006">
-    <mc:Choice xmlns:p159="http://schemas.microsoft.com/office/powerpoint/2015/09/main" Requires="p159">
+  <mc:AlternateContent xmlns:mc="http://schemas.openxmlformats.org/markup-compatibility/2006" xmlns:p159="http://schemas.microsoft.com/office/powerpoint/2015/09/main">
+    <mc:Choice Requires="p159">
       <p:transition xmlns:p14="http://schemas.microsoft.com/office/powerpoint/2010/main" spd="slow" p14:dur="2000" advTm="4000">
         <p159:morph option="byObject"/>
       </p:transition>
     </mc:Choice>
-    <mc:Fallback>
+    <mc:Fallback xmlns="">
       <p:transition spd="slow" advTm="4000">
         <p:fade/>
       </p:transition>
@@ -11805,13 +11724,13 @@
   <p:clrMapOvr>
     <a:masterClrMapping/>
   </p:clrMapOvr>
-  <mc:AlternateContent xmlns:mc="http://schemas.openxmlformats.org/markup-compatibility/2006">
-    <mc:Choice xmlns:p159="http://schemas.microsoft.com/office/powerpoint/2015/09/main" Requires="p159">
+  <mc:AlternateContent xmlns:mc="http://schemas.openxmlformats.org/markup-compatibility/2006" xmlns:p159="http://schemas.microsoft.com/office/powerpoint/2015/09/main">
+    <mc:Choice Requires="p159">
       <p:transition spd="slow" advTm="11000">
         <p159:morph option="byObject"/>
       </p:transition>
     </mc:Choice>
-    <mc:Fallback>
+    <mc:Fallback xmlns="">
       <p:transition spd="slow" advTm="11000">
         <p:fade/>
       </p:transition>
@@ -14841,7 +14760,7 @@
                   </a:schemeClr>
                 </a:solidFill>
               </a:rPr>
-              <a:t>Mon, 18 Jul 2016 16:06:00 GMT</a:t>
+              <a:t>Mon, 19 Feb 2024 16:06:00 GMT</a:t>
             </a:r>
           </a:p>
           <a:p>
@@ -19281,14 +19200,14 @@
   <p:clrMapOvr>
     <a:masterClrMapping/>
   </p:clrMapOvr>
-  <mc:AlternateContent xmlns:mc="http://schemas.openxmlformats.org/markup-compatibility/2006" xmlns:p159="http://schemas.microsoft.com/office/powerpoint/2015/09/main">
-    <mc:Choice Requires="p159">
-      <p:transition advTm="1000">
+  <mc:AlternateContent xmlns:mc="http://schemas.openxmlformats.org/markup-compatibility/2006">
+    <mc:Choice xmlns:p159="http://schemas.microsoft.com/office/powerpoint/2015/09/main" Requires="p159">
+      <p:transition advTm="1500">
         <p159:morph option="byObject"/>
       </p:transition>
     </mc:Choice>
-    <mc:Fallback xmlns="">
-      <p:transition advTm="1000">
+    <mc:Fallback>
+      <p:transition advTm="1500">
         <p:fade/>
       </p:transition>
     </mc:Fallback>
@@ -20504,14 +20423,14 @@
               <a:t>"</a:t>
             </a:r>
             <a:r>
-              <a:rPr lang="tr-TR" sz="1800" b="0" i="0" dirty="0">
+              <a:rPr lang="tr-TR" sz="1800" b="0" i="0" dirty="0" err="1">
                 <a:solidFill>
                   <a:schemeClr val="accent2"/>
                 </a:solidFill>
                 <a:effectLst/>
                 <a:latin typeface="Consolas" panose="020B0609020204030204" pitchFamily="49" charset="0"/>
               </a:rPr>
-              <a:t>celcius</a:t>
+              <a:t>celsius</a:t>
             </a:r>
             <a:r>
               <a:rPr lang="en-US" sz="1800" b="0" i="0" dirty="0">
@@ -21474,14 +21393,14 @@
               <a:t>"</a:t>
             </a:r>
             <a:r>
-              <a:rPr lang="tr-TR" sz="1800" b="0" i="0" dirty="0">
+              <a:rPr lang="tr-TR" sz="1800" b="0" i="0" dirty="0" err="1">
                 <a:solidFill>
                   <a:schemeClr val="accent2"/>
                 </a:solidFill>
                 <a:effectLst/>
                 <a:latin typeface="Consolas" panose="020B0609020204030204" pitchFamily="49" charset="0"/>
               </a:rPr>
-              <a:t>celcius</a:t>
+              <a:t>celsius</a:t>
             </a:r>
             <a:r>
               <a:rPr lang="en-US" sz="1800" b="0" i="0" dirty="0">
@@ -24010,14 +23929,14 @@
               <a:t>"</a:t>
             </a:r>
             <a:r>
-              <a:rPr lang="tr-TR" sz="1800" b="0" i="0" dirty="0">
+              <a:rPr lang="tr-TR" sz="1800" b="0" i="0" dirty="0" err="1">
                 <a:solidFill>
                   <a:schemeClr val="accent2"/>
                 </a:solidFill>
                 <a:effectLst/>
                 <a:latin typeface="Consolas" panose="020B0609020204030204" pitchFamily="49" charset="0"/>
               </a:rPr>
-              <a:t>celcius</a:t>
+              <a:t>celsius</a:t>
             </a:r>
             <a:r>
               <a:rPr lang="en-US" sz="1800" b="0" i="0" dirty="0">
@@ -24691,14 +24610,14 @@
               <a:t>"</a:t>
             </a:r>
             <a:r>
-              <a:rPr lang="tr-TR" b="0" i="0" dirty="0">
+              <a:rPr lang="tr-TR" b="0" i="0" dirty="0" err="1">
                 <a:solidFill>
                   <a:schemeClr val="accent2"/>
                 </a:solidFill>
                 <a:effectLst/>
                 <a:latin typeface="Consolas" panose="020B0609020204030204" pitchFamily="49" charset="0"/>
               </a:rPr>
-              <a:t>celcius</a:t>
+              <a:t>celsius</a:t>
             </a:r>
             <a:r>
               <a:rPr lang="en-US" b="0" i="0" dirty="0">
@@ -26477,14 +26396,14 @@
   <p:clrMapOvr>
     <a:masterClrMapping/>
   </p:clrMapOvr>
-  <mc:AlternateContent xmlns:mc="http://schemas.openxmlformats.org/markup-compatibility/2006" xmlns:p159="http://schemas.microsoft.com/office/powerpoint/2015/09/main">
-    <mc:Choice Requires="p159">
-      <p:transition xmlns:p14="http://schemas.microsoft.com/office/powerpoint/2010/main" spd="slow" p14:dur="2000" advTm="8000">
+  <mc:AlternateContent xmlns:mc="http://schemas.openxmlformats.org/markup-compatibility/2006">
+    <mc:Choice xmlns:p159="http://schemas.microsoft.com/office/powerpoint/2015/09/main" Requires="p159">
+      <p:transition xmlns:p14="http://schemas.microsoft.com/office/powerpoint/2010/main" spd="slow" p14:dur="2000" advTm="12500">
         <p159:morph option="byObject"/>
       </p:transition>
     </mc:Choice>
-    <mc:Fallback xmlns="">
-      <p:transition spd="slow" advTm="8000">
+    <mc:Fallback>
+      <p:transition spd="slow" advTm="12500">
         <p:fade/>
       </p:transition>
     </mc:Fallback>
@@ -28396,7 +28315,7 @@
                 </a:solidFill>
                 <a:latin typeface="Consolas" panose="020B0609020204030204" pitchFamily="49" charset="0"/>
               </a:rPr>
-              <a:t>               "value"</a:t>
+              <a:t>            "value"</a:t>
             </a:r>
             <a:r>
               <a:rPr lang="en-US" altLang="en-US" sz="1000" dirty="0">
@@ -28469,7 +28388,7 @@
                 </a:solidFill>
                 <a:latin typeface="Consolas" panose="020B0609020204030204" pitchFamily="49" charset="0"/>
               </a:rPr>
-              <a:t>	   "unit"</a:t>
+              <a:t>            "unit"</a:t>
             </a:r>
             <a:r>
               <a:rPr lang="en-US" altLang="en-US" sz="1000" dirty="0">
@@ -28967,7 +28886,7 @@
                 </a:solidFill>
                 <a:latin typeface="Consolas" panose="020B0609020204030204" pitchFamily="49" charset="0"/>
               </a:rPr>
-              <a:t>               "value"</a:t>
+              <a:t>            "value"</a:t>
             </a:r>
             <a:r>
               <a:rPr lang="en-US" altLang="en-US" sz="1000" dirty="0">
@@ -29040,7 +28959,7 @@
                 </a:solidFill>
                 <a:latin typeface="Consolas" panose="020B0609020204030204" pitchFamily="49" charset="0"/>
               </a:rPr>
-              <a:t>               "unit"</a:t>
+              <a:t>            "unit"</a:t>
             </a:r>
             <a:r>
               <a:rPr lang="en-US" altLang="en-US" sz="1000" dirty="0">
@@ -29450,7 +29369,7 @@
                 </a:solidFill>
                 <a:latin typeface="Consolas" panose="020B0609020204030204" pitchFamily="49" charset="0"/>
               </a:rPr>
-              <a:t>               "value"</a:t>
+              <a:t>            "value"</a:t>
             </a:r>
             <a:r>
               <a:rPr lang="en-US" altLang="en-US" sz="1000" dirty="0">
@@ -29504,6 +29423,15 @@
             <a:r>
               <a:rPr lang="en-US" altLang="en-US" sz="1000" dirty="0">
                 <a:solidFill>
+                  <a:schemeClr val="accent1"/>
+                </a:solidFill>
+                <a:latin typeface="Consolas" panose="020B0609020204030204" pitchFamily="49" charset="0"/>
+              </a:rPr>
+              <a:t>            </a:t>
+            </a:r>
+            <a:r>
+              <a:rPr lang="en-US" altLang="en-US" sz="1000" dirty="0">
+                <a:solidFill>
                   <a:schemeClr val="accent1">
                     <a:lumMod val="60000"/>
                     <a:lumOff val="40000"/>
@@ -29511,7 +29439,7 @@
                 </a:solidFill>
                 <a:latin typeface="Consolas" panose="020B0609020204030204" pitchFamily="49" charset="0"/>
               </a:rPr>
-              <a:t>	   "unit"</a:t>
+              <a:t>"unit"</a:t>
             </a:r>
             <a:r>
               <a:rPr lang="en-US" altLang="en-US" sz="1000" dirty="0">
@@ -29735,14 +29663,14 @@
   <p:clrMapOvr>
     <a:masterClrMapping/>
   </p:clrMapOvr>
-  <mc:AlternateContent xmlns:mc="http://schemas.openxmlformats.org/markup-compatibility/2006" xmlns:p14="http://schemas.microsoft.com/office/powerpoint/2010/main">
-    <mc:Choice Requires="p14">
-      <p:transition spd="slow" p14:dur="1500" advTm="16000">
+  <mc:AlternateContent xmlns:mc="http://schemas.openxmlformats.org/markup-compatibility/2006">
+    <mc:Choice xmlns:p14="http://schemas.microsoft.com/office/powerpoint/2010/main" Requires="p14">
+      <p:transition spd="slow" p14:dur="1500" advTm="12000">
         <p:fade/>
       </p:transition>
     </mc:Choice>
-    <mc:Fallback xmlns="">
-      <p:transition spd="slow" advTm="16000">
+    <mc:Fallback>
+      <p:transition spd="slow" advTm="12000">
         <p:fade/>
       </p:transition>
     </mc:Fallback>
@@ -30788,7 +30716,7 @@
                 <a:effectLst/>
                 <a:latin typeface="Consolas" panose="020B0609020204030204" pitchFamily="49" charset="0"/>
               </a:rPr>
-              <a:t>    </a:t>
+              <a:t>   </a:t>
             </a:r>
             <a:r>
               <a:rPr lang="en-US" sz="1800" b="0" i="0" dirty="0">
@@ -30884,7 +30812,7 @@
                 </a:solidFill>
                 <a:latin typeface="Consolas" panose="020B0609020204030204" pitchFamily="49" charset="0"/>
               </a:rPr>
-              <a:t>    "base"</a:t>
+              <a:t>   "base"</a:t>
             </a:r>
             <a:r>
               <a:rPr lang="en-US" sz="1800" dirty="0">
@@ -30902,7 +30830,25 @@
                 </a:solidFill>
                 <a:latin typeface="Consolas" panose="020B0609020204030204" pitchFamily="49" charset="0"/>
               </a:rPr>
-              <a:t>“https://example.com”</a:t>
+              <a:t>"https://</a:t>
+            </a:r>
+            <a:r>
+              <a:rPr lang="en-US" sz="1800" dirty="0" err="1">
+                <a:solidFill>
+                  <a:schemeClr val="accent2"/>
+                </a:solidFill>
+                <a:latin typeface="Consolas" panose="020B0609020204030204" pitchFamily="49" charset="0"/>
+              </a:rPr>
+              <a:t>example.com</a:t>
+            </a:r>
+            <a:r>
+              <a:rPr lang="en-US" sz="1800" dirty="0">
+                <a:solidFill>
+                  <a:schemeClr val="accent2"/>
+                </a:solidFill>
+                <a:latin typeface="Consolas" panose="020B0609020204030204" pitchFamily="49" charset="0"/>
+              </a:rPr>
+              <a:t>"</a:t>
             </a:r>
             <a:r>
               <a:rPr lang="en-US" sz="1800" dirty="0">
@@ -30949,7 +30895,7 @@
                 <a:effectLst/>
                 <a:latin typeface="Consolas" panose="020B0609020204030204" pitchFamily="49" charset="0"/>
               </a:rPr>
-              <a:t>    </a:t>
+              <a:t>   </a:t>
             </a:r>
             <a:r>
               <a:rPr lang="en-US" sz="1800" b="0" i="0" dirty="0">
@@ -31009,7 +30955,7 @@
                 </a:solidFill>
                 <a:latin typeface="Consolas" panose="020B0609020204030204" pitchFamily="49" charset="0"/>
               </a:rPr>
-              <a:t>         </a:t>
+              <a:t>      </a:t>
             </a:r>
             <a:r>
               <a:rPr lang="en-US" sz="1800" b="0" i="0" dirty="0">
@@ -31053,15 +30999,6 @@
               <a:buNone/>
             </a:pPr>
             <a:r>
-              <a:rPr lang="tr-TR" sz="1800" dirty="0">
-                <a:solidFill>
-                  <a:srgbClr val="986801"/>
-                </a:solidFill>
-                <a:latin typeface="Consolas" panose="020B0609020204030204" pitchFamily="49" charset="0"/>
-              </a:rPr>
-              <a:t>              </a:t>
-            </a:r>
-            <a:r>
               <a:rPr lang="en-US" sz="1800" b="0" i="0" dirty="0">
                 <a:solidFill>
                   <a:schemeClr val="accent1">
@@ -31072,7 +31009,7 @@
                 <a:effectLst/>
                 <a:latin typeface="Consolas" panose="020B0609020204030204" pitchFamily="49" charset="0"/>
               </a:rPr>
-              <a:t>"type"</a:t>
+              <a:t>	 "type"</a:t>
             </a:r>
             <a:r>
               <a:rPr lang="en-US" sz="1800" b="0" i="0" dirty="0">
@@ -31136,15 +31073,6 @@
               <a:buNone/>
             </a:pPr>
             <a:r>
-              <a:rPr lang="en-US" sz="1800" dirty="0">
-                <a:solidFill>
-                  <a:srgbClr val="383A42"/>
-                </a:solidFill>
-                <a:latin typeface="Consolas" panose="020B0609020204030204" pitchFamily="49" charset="0"/>
-              </a:rPr>
-              <a:t>	       </a:t>
-            </a:r>
-            <a:r>
               <a:rPr lang="en-US" sz="1800" b="0" i="0" dirty="0">
                 <a:solidFill>
                   <a:schemeClr val="accent1">
@@ -31155,7 +31083,7 @@
                 <a:effectLst/>
                 <a:latin typeface="Consolas" panose="020B0609020204030204" pitchFamily="49" charset="0"/>
               </a:rPr>
-              <a:t>"forms"</a:t>
+              <a:t>	 "forms"</a:t>
             </a:r>
             <a:r>
               <a:rPr lang="en-US" sz="1800" b="0" i="0" dirty="0">
@@ -31282,7 +31210,7 @@
                 <a:effectLst/>
                 <a:latin typeface="Consolas" panose="020B0609020204030204" pitchFamily="49" charset="0"/>
               </a:rPr>
-              <a:t>        </a:t>
+              <a:t>      </a:t>
             </a:r>
             <a:r>
               <a:rPr lang="en-US" sz="1800" b="0" i="0" dirty="0">
@@ -31356,7 +31284,7 @@
                 <a:effectLst/>
                 <a:latin typeface="Consolas" panose="020B0609020204030204" pitchFamily="49" charset="0"/>
               </a:rPr>
-              <a:t>    </a:t>
+              <a:t>   </a:t>
             </a:r>
             <a:r>
               <a:rPr lang="en-US" sz="1800" b="0" i="0" dirty="0">
@@ -31429,17 +31357,16 @@
                 <a:effectLst/>
                 <a:latin typeface="Consolas" panose="020B0609020204030204" pitchFamily="49" charset="0"/>
               </a:rPr>
-              <a:t>:{</a:t>
-            </a:r>
-            <a:r>
-              <a:rPr lang="en-US" sz="1800" b="0" i="0" dirty="0">
-                <a:solidFill>
-                  <a:srgbClr val="383A42"/>
-                </a:solidFill>
-                <a:effectLst/>
-                <a:latin typeface="Consolas" panose="020B0609020204030204" pitchFamily="49" charset="0"/>
-              </a:rPr>
-              <a:t>…}</a:t>
+              <a:t>: {…</a:t>
+            </a:r>
+            <a:r>
+              <a:rPr lang="en-US" sz="1800" dirty="0">
+                <a:solidFill>
+                  <a:schemeClr val="accent1"/>
+                </a:solidFill>
+                <a:latin typeface="Consolas" panose="020B0609020204030204" pitchFamily="49" charset="0"/>
+              </a:rPr>
+              <a:t>}</a:t>
             </a:r>
             <a:r>
               <a:rPr lang="tr-TR" sz="1800" b="0" i="0" dirty="0">
@@ -36876,13 +36803,13 @@
   <p:clrMapOvr>
     <a:masterClrMapping/>
   </p:clrMapOvr>
-  <mc:AlternateContent xmlns:mc="http://schemas.openxmlformats.org/markup-compatibility/2006">
-    <mc:Choice xmlns:p159="http://schemas.microsoft.com/office/powerpoint/2015/09/main" Requires="p159">
+  <mc:AlternateContent xmlns:mc="http://schemas.openxmlformats.org/markup-compatibility/2006" xmlns:p159="http://schemas.microsoft.com/office/powerpoint/2015/09/main">
+    <mc:Choice Requires="p159">
       <p:transition xmlns:p14="http://schemas.microsoft.com/office/powerpoint/2010/main" spd="slow" p14:dur="2000" advTm="0">
         <p159:morph option="byObject"/>
       </p:transition>
     </mc:Choice>
-    <mc:Fallback>
+    <mc:Fallback xmlns="">
       <p:transition spd="slow" advTm="0">
         <p:fade/>
       </p:transition>

</xml_diff>

<commit_message>
fix code snippets and upscale videos
</commit_message>
<xml_diff>
--- a/Tutorials/whatiswot/2-Payloads_and_Headers/2-Payloads_and_Headers.pptx
+++ b/Tutorials/whatiswot/2-Payloads_and_Headers/2-Payloads_and_Headers.pptx
@@ -5,7 +5,7 @@
     <p:sldMasterId id="2147483696" r:id="rId1"/>
   </p:sldMasterIdLst>
   <p:notesMasterIdLst>
-    <p:notesMasterId r:id="rId43"/>
+    <p:notesMasterId r:id="rId44"/>
   </p:notesMasterIdLst>
   <p:sldIdLst>
     <p:sldId id="313" r:id="rId2"/>
@@ -46,9 +46,10 @@
     <p:sldId id="270" r:id="rId37"/>
     <p:sldId id="273" r:id="rId38"/>
     <p:sldId id="339" r:id="rId39"/>
-    <p:sldId id="276" r:id="rId40"/>
-    <p:sldId id="318" r:id="rId41"/>
-    <p:sldId id="354" r:id="rId42"/>
+    <p:sldId id="355" r:id="rId40"/>
+    <p:sldId id="276" r:id="rId41"/>
+    <p:sldId id="318" r:id="rId42"/>
+    <p:sldId id="354" r:id="rId43"/>
   </p:sldIdLst>
   <p:sldSz cx="12192000" cy="6858000"/>
   <p:notesSz cx="6858000" cy="9144000"/>
@@ -345,7 +346,7 @@
             <a:fld id="{BE133555-111A-4397-9510-7D1E642AA942}" type="datetimeFigureOut">
               <a:rPr lang="en-US" smtClean="0"/>
               <a:pPr/>
-              <a:t>7/5/24</a:t>
+              <a:t>7/25/2024</a:t>
             </a:fld>
             <a:endParaRPr lang="en-US" dirty="0"/>
           </a:p>
@@ -4460,15 +4461,53 @@
           <a:lstStyle/>
           <a:p>
             <a:r>
-              <a:rPr lang="en-GB" b="0" i="0" u="none" strike="noStrike" dirty="0">
-                <a:solidFill>
-                  <a:srgbClr val="FFFFFF"/>
-                </a:solidFill>
-                <a:effectLst/>
-                <a:latin typeface="Roboto" panose="020F0502020204030204" pitchFamily="34" charset="0"/>
-              </a:rPr>
-              <a:t>You can proceed to the next tutorial by clicking on the card or the video description.</a:t>
-            </a:r>
+              <a:rPr lang="en-DE" dirty="0"/>
+              <a:t>Make sure to use a TD from the version 1.1: </a:t>
+            </a:r>
+            <a:r>
+              <a:rPr lang="en-GB" dirty="0"/>
+              <a:t>https://www.w3.org/TR/wot-thing-description11/ -&gt; description box.</a:t>
+            </a:r>
+            <a:endParaRPr lang="tr-TR" dirty="0"/>
+          </a:p>
+          <a:p>
+            <a:endParaRPr lang="tr-TR" dirty="0"/>
+          </a:p>
+          <a:p>
+            <a:pPr marL="0" marR="0" lvl="0" indent="0" algn="l" defTabSz="914400" rtl="0" eaLnBrk="1" fontAlgn="auto" latinLnBrk="0" hangingPunct="1">
+              <a:lnSpc>
+                <a:spcPct val="100000"/>
+              </a:lnSpc>
+              <a:spcBef>
+                <a:spcPts val="0"/>
+              </a:spcBef>
+              <a:spcAft>
+                <a:spcPts val="0"/>
+              </a:spcAft>
+              <a:buClrTx/>
+              <a:buSzTx/>
+              <a:buFontTx/>
+              <a:buNone/>
+              <a:tabLst/>
+              <a:defRPr/>
+            </a:pPr>
+            <a:r>
+              <a:rPr lang="en-US" sz="1800" dirty="0">
+                <a:solidFill>
+                  <a:srgbClr val="000000"/>
+                </a:solidFill>
+                <a:latin typeface="Segoe UI" panose="020B0502040204020203" pitchFamily="34" charset="0"/>
+              </a:rPr>
+              <a:t>Here, you can see an example of a TD in JSON format. We will go later into the details of how a TD should be structured and understood.</a:t>
+            </a:r>
+            <a:endParaRPr lang="en-US" sz="1800" dirty="0">
+              <a:solidFill>
+                <a:prstClr val="black"/>
+              </a:solidFill>
+              <a:latin typeface="Segoe UI" panose="020B0502040204020203" pitchFamily="34" charset="0"/>
+            </a:endParaRPr>
+          </a:p>
+          <a:p>
             <a:endParaRPr lang="tr-TR" dirty="0"/>
           </a:p>
         </p:txBody>
@@ -4499,7 +4538,7 @@
     </p:spTree>
     <p:extLst>
       <p:ext uri="{BB962C8B-B14F-4D97-AF65-F5344CB8AC3E}">
-        <p14:creationId xmlns:p14="http://schemas.microsoft.com/office/powerpoint/2010/main" val="1820635812"/>
+        <p14:creationId xmlns:p14="http://schemas.microsoft.com/office/powerpoint/2010/main" val="359751915"/>
       </p:ext>
     </p:extLst>
   </p:cSld>
@@ -4707,9 +4746,16 @@
           <a:lstStyle/>
           <a:p>
             <a:r>
-              <a:rPr lang="en-US" dirty="0"/>
-              <a:t>In the next video, we will talk about JSON and what it is in detail.</a:t>
-            </a:r>
+              <a:rPr lang="en-GB" b="0" i="0" u="none" strike="noStrike" dirty="0">
+                <a:solidFill>
+                  <a:srgbClr val="FFFFFF"/>
+                </a:solidFill>
+                <a:effectLst/>
+                <a:latin typeface="Roboto" panose="020F0502020204030204" pitchFamily="34" charset="0"/>
+              </a:rPr>
+              <a:t>You can proceed to the next tutorial by clicking on the card or the video description.</a:t>
+            </a:r>
+            <a:endParaRPr lang="tr-TR" dirty="0"/>
           </a:p>
         </p:txBody>
       </p:sp>
@@ -4730,17 +4776,16 @@
           <a:p>
             <a:fld id="{838D45EA-097A-449E-8E80-C10F8140ABDB}" type="slidenum">
               <a:rPr lang="en-US" smtClean="0"/>
-              <a:pPr/>
               <a:t>40</a:t>
             </a:fld>
-            <a:endParaRPr lang="en-US" dirty="0"/>
+            <a:endParaRPr lang="en-US"/>
           </a:p>
         </p:txBody>
       </p:sp>
     </p:spTree>
     <p:extLst>
       <p:ext uri="{BB962C8B-B14F-4D97-AF65-F5344CB8AC3E}">
-        <p14:creationId xmlns:p14="http://schemas.microsoft.com/office/powerpoint/2010/main" val="3359729754"/>
+        <p14:creationId xmlns:p14="http://schemas.microsoft.com/office/powerpoint/2010/main" val="1820635812"/>
       </p:ext>
     </p:extLst>
   </p:cSld>
@@ -4794,7 +4839,10 @@
           <a:bodyPr/>
           <a:lstStyle/>
           <a:p>
-            <a:endParaRPr lang="en-US" dirty="0"/>
+            <a:r>
+              <a:rPr lang="en-US" dirty="0"/>
+              <a:t>In the next video, we will talk about JSON and what it is in detail.</a:t>
+            </a:r>
           </a:p>
         </p:txBody>
       </p:sp>
@@ -4813,9 +4861,94 @@
           <a:bodyPr/>
           <a:lstStyle/>
           <a:p>
+            <a:fld id="{838D45EA-097A-449E-8E80-C10F8140ABDB}" type="slidenum">
+              <a:rPr lang="en-US" smtClean="0"/>
+              <a:pPr/>
+              <a:t>41</a:t>
+            </a:fld>
+            <a:endParaRPr lang="en-US" dirty="0"/>
+          </a:p>
+        </p:txBody>
+      </p:sp>
+    </p:spTree>
+    <p:extLst>
+      <p:ext uri="{BB962C8B-B14F-4D97-AF65-F5344CB8AC3E}">
+        <p14:creationId xmlns:p14="http://schemas.microsoft.com/office/powerpoint/2010/main" val="3359729754"/>
+      </p:ext>
+    </p:extLst>
+  </p:cSld>
+  <p:clrMapOvr>
+    <a:masterClrMapping/>
+  </p:clrMapOvr>
+</p:notes>
+</file>
+
+<file path=ppt/notesSlides/notesSlide42.xml><?xml version="1.0" encoding="utf-8"?>
+<p:notes xmlns:a="http://schemas.openxmlformats.org/drawingml/2006/main" xmlns:r="http://schemas.openxmlformats.org/officeDocument/2006/relationships" xmlns:p="http://schemas.openxmlformats.org/presentationml/2006/main">
+  <p:cSld>
+    <p:spTree>
+      <p:nvGrpSpPr>
+        <p:cNvPr id="1" name=""/>
+        <p:cNvGrpSpPr/>
+        <p:nvPr/>
+      </p:nvGrpSpPr>
+      <p:grpSpPr>
+        <a:xfrm>
+          <a:off x="0" y="0"/>
+          <a:ext cx="0" cy="0"/>
+          <a:chOff x="0" y="0"/>
+          <a:chExt cx="0" cy="0"/>
+        </a:xfrm>
+      </p:grpSpPr>
+      <p:sp>
+        <p:nvSpPr>
+          <p:cNvPr id="2" name="Slide Image Placeholder 1"/>
+          <p:cNvSpPr>
+            <a:spLocks noGrp="1" noRot="1" noChangeAspect="1"/>
+          </p:cNvSpPr>
+          <p:nvPr>
+            <p:ph type="sldImg"/>
+          </p:nvPr>
+        </p:nvSpPr>
+        <p:spPr/>
+      </p:sp>
+      <p:sp>
+        <p:nvSpPr>
+          <p:cNvPr id="3" name="Notes Placeholder 2"/>
+          <p:cNvSpPr>
+            <a:spLocks noGrp="1"/>
+          </p:cNvSpPr>
+          <p:nvPr>
+            <p:ph type="body" idx="1"/>
+          </p:nvPr>
+        </p:nvSpPr>
+        <p:spPr/>
+        <p:txBody>
+          <a:bodyPr/>
+          <a:lstStyle/>
+          <a:p>
+            <a:endParaRPr lang="en-US" dirty="0"/>
+          </a:p>
+        </p:txBody>
+      </p:sp>
+      <p:sp>
+        <p:nvSpPr>
+          <p:cNvPr id="4" name="Slide Number Placeholder 3"/>
+          <p:cNvSpPr>
+            <a:spLocks noGrp="1"/>
+          </p:cNvSpPr>
+          <p:nvPr>
+            <p:ph type="sldNum" sz="quarter" idx="5"/>
+          </p:nvPr>
+        </p:nvSpPr>
+        <p:spPr/>
+        <p:txBody>
+          <a:bodyPr/>
+          <a:lstStyle/>
+          <a:p>
             <a:fld id="{050711E8-F1A4-440D-86C4-AD090AA3185A}" type="slidenum">
               <a:rPr lang="en-US" smtClean="0"/>
-              <a:t>41</a:t>
+              <a:t>42</a:t>
             </a:fld>
             <a:endParaRPr lang="en-US"/>
           </a:p>
@@ -5664,7 +5797,7 @@
           <a:p>
             <a:fld id="{1ECB4361-894C-4E1E-9D40-0AFC03E55FFF}" type="datetimeFigureOut">
               <a:rPr lang="en-US" smtClean="0"/>
-              <a:t>7/5/24</a:t>
+              <a:t>7/25/2024</a:t>
             </a:fld>
             <a:endParaRPr lang="en-US"/>
           </a:p>
@@ -5834,7 +5967,7 @@
           <a:p>
             <a:fld id="{1ECB4361-894C-4E1E-9D40-0AFC03E55FFF}" type="datetimeFigureOut">
               <a:rPr lang="en-US" smtClean="0"/>
-              <a:t>7/5/24</a:t>
+              <a:t>7/25/2024</a:t>
             </a:fld>
             <a:endParaRPr lang="en-US"/>
           </a:p>
@@ -6014,7 +6147,7 @@
           <a:p>
             <a:fld id="{1ECB4361-894C-4E1E-9D40-0AFC03E55FFF}" type="datetimeFigureOut">
               <a:rPr lang="en-US" smtClean="0"/>
-              <a:t>7/5/24</a:t>
+              <a:t>7/25/2024</a:t>
             </a:fld>
             <a:endParaRPr lang="en-US"/>
           </a:p>
@@ -6184,7 +6317,7 @@
           <a:p>
             <a:fld id="{1ECB4361-894C-4E1E-9D40-0AFC03E55FFF}" type="datetimeFigureOut">
               <a:rPr lang="en-US" smtClean="0"/>
-              <a:t>7/5/24</a:t>
+              <a:t>7/25/2024</a:t>
             </a:fld>
             <a:endParaRPr lang="en-US"/>
           </a:p>
@@ -6430,7 +6563,7 @@
           <a:p>
             <a:fld id="{1ECB4361-894C-4E1E-9D40-0AFC03E55FFF}" type="datetimeFigureOut">
               <a:rPr lang="en-US" smtClean="0"/>
-              <a:t>7/5/24</a:t>
+              <a:t>7/25/2024</a:t>
             </a:fld>
             <a:endParaRPr lang="en-US"/>
           </a:p>
@@ -6662,7 +6795,7 @@
           <a:p>
             <a:fld id="{1ECB4361-894C-4E1E-9D40-0AFC03E55FFF}" type="datetimeFigureOut">
               <a:rPr lang="en-US" smtClean="0"/>
-              <a:t>7/5/24</a:t>
+              <a:t>7/25/2024</a:t>
             </a:fld>
             <a:endParaRPr lang="en-US"/>
           </a:p>
@@ -7029,7 +7162,7 @@
           <a:p>
             <a:fld id="{1ECB4361-894C-4E1E-9D40-0AFC03E55FFF}" type="datetimeFigureOut">
               <a:rPr lang="en-US" smtClean="0"/>
-              <a:t>7/5/24</a:t>
+              <a:t>7/25/2024</a:t>
             </a:fld>
             <a:endParaRPr lang="en-US"/>
           </a:p>
@@ -7147,7 +7280,7 @@
           <a:p>
             <a:fld id="{1ECB4361-894C-4E1E-9D40-0AFC03E55FFF}" type="datetimeFigureOut">
               <a:rPr lang="en-US" smtClean="0"/>
-              <a:t>7/5/24</a:t>
+              <a:t>7/25/2024</a:t>
             </a:fld>
             <a:endParaRPr lang="en-US"/>
           </a:p>
@@ -7242,7 +7375,7 @@
           <a:p>
             <a:fld id="{1ECB4361-894C-4E1E-9D40-0AFC03E55FFF}" type="datetimeFigureOut">
               <a:rPr lang="en-US" smtClean="0"/>
-              <a:t>7/5/24</a:t>
+              <a:t>7/25/2024</a:t>
             </a:fld>
             <a:endParaRPr lang="en-US"/>
           </a:p>
@@ -7519,7 +7652,7 @@
           <a:p>
             <a:fld id="{1ECB4361-894C-4E1E-9D40-0AFC03E55FFF}" type="datetimeFigureOut">
               <a:rPr lang="en-US" smtClean="0"/>
-              <a:t>7/5/24</a:t>
+              <a:t>7/25/2024</a:t>
             </a:fld>
             <a:endParaRPr lang="en-US"/>
           </a:p>
@@ -7776,7 +7909,7 @@
           <a:p>
             <a:fld id="{1ECB4361-894C-4E1E-9D40-0AFC03E55FFF}" type="datetimeFigureOut">
               <a:rPr lang="en-US" smtClean="0"/>
-              <a:t>7/5/24</a:t>
+              <a:t>7/25/2024</a:t>
             </a:fld>
             <a:endParaRPr lang="en-US"/>
           </a:p>
@@ -7995,7 +8128,7 @@
             <a:fld id="{1ECB4361-894C-4E1E-9D40-0AFC03E55FFF}" type="datetimeFigureOut">
               <a:rPr lang="en-US" smtClean="0"/>
               <a:pPr/>
-              <a:t>7/5/24</a:t>
+              <a:t>7/25/2024</a:t>
             </a:fld>
             <a:endParaRPr lang="en-US" dirty="0"/>
           </a:p>
@@ -19200,13 +19333,13 @@
   <p:clrMapOvr>
     <a:masterClrMapping/>
   </p:clrMapOvr>
-  <mc:AlternateContent xmlns:mc="http://schemas.openxmlformats.org/markup-compatibility/2006">
-    <mc:Choice xmlns:p159="http://schemas.microsoft.com/office/powerpoint/2015/09/main" Requires="p159">
+  <mc:AlternateContent xmlns:mc="http://schemas.openxmlformats.org/markup-compatibility/2006" xmlns:p159="http://schemas.microsoft.com/office/powerpoint/2015/09/main">
+    <mc:Choice Requires="p159">
       <p:transition advTm="1500">
         <p159:morph option="byObject"/>
       </p:transition>
     </mc:Choice>
-    <mc:Fallback>
+    <mc:Fallback xmlns="">
       <p:transition advTm="1500">
         <p:fade/>
       </p:transition>
@@ -26396,13 +26529,13 @@
   <p:clrMapOvr>
     <a:masterClrMapping/>
   </p:clrMapOvr>
-  <mc:AlternateContent xmlns:mc="http://schemas.openxmlformats.org/markup-compatibility/2006">
-    <mc:Choice xmlns:p159="http://schemas.microsoft.com/office/powerpoint/2015/09/main" Requires="p159">
+  <mc:AlternateContent xmlns:mc="http://schemas.openxmlformats.org/markup-compatibility/2006" xmlns:p159="http://schemas.microsoft.com/office/powerpoint/2015/09/main">
+    <mc:Choice Requires="p159">
       <p:transition xmlns:p14="http://schemas.microsoft.com/office/powerpoint/2010/main" spd="slow" p14:dur="2000" advTm="12500">
         <p159:morph option="byObject"/>
       </p:transition>
     </mc:Choice>
-    <mc:Fallback>
+    <mc:Fallback xmlns="">
       <p:transition spd="slow" advTm="12500">
         <p:fade/>
       </p:transition>
@@ -29663,13 +29796,13 @@
   <p:clrMapOvr>
     <a:masterClrMapping/>
   </p:clrMapOvr>
-  <mc:AlternateContent xmlns:mc="http://schemas.openxmlformats.org/markup-compatibility/2006">
-    <mc:Choice xmlns:p14="http://schemas.microsoft.com/office/powerpoint/2010/main" Requires="p14">
+  <mc:AlternateContent xmlns:mc="http://schemas.openxmlformats.org/markup-compatibility/2006" xmlns:p14="http://schemas.microsoft.com/office/powerpoint/2010/main">
+    <mc:Choice Requires="p14">
       <p:transition spd="slow" p14:dur="1500" advTm="12000">
         <p:fade/>
       </p:transition>
     </mc:Choice>
-    <mc:Fallback>
+    <mc:Fallback xmlns="">
       <p:transition spd="slow" advTm="12000">
         <p:fade/>
       </p:transition>
@@ -30408,6 +30541,2091 @@
       </p:sp>
       <p:sp>
         <p:nvSpPr>
+          <p:cNvPr id="7" name="Content Placeholder 6">
+            <a:extLst>
+              <a:ext uri="{FF2B5EF4-FFF2-40B4-BE49-F238E27FC236}">
+                <a16:creationId xmlns:a16="http://schemas.microsoft.com/office/drawing/2014/main" id="{19351C75-941B-37FB-A72C-D001A933700C}"/>
+              </a:ext>
+            </a:extLst>
+          </p:cNvPr>
+          <p:cNvSpPr>
+            <a:spLocks noGrp="1"/>
+          </p:cNvSpPr>
+          <p:nvPr>
+            <p:ph idx="1"/>
+          </p:nvPr>
+        </p:nvSpPr>
+        <p:spPr/>
+        <p:txBody>
+          <a:bodyPr/>
+          <a:lstStyle/>
+          <a:p>
+            <a:endParaRPr lang="en-US" dirty="0"/>
+          </a:p>
+        </p:txBody>
+      </p:sp>
+      <p:pic>
+        <p:nvPicPr>
+          <p:cNvPr id="9" name="Picture 8">
+            <a:extLst>
+              <a:ext uri="{FF2B5EF4-FFF2-40B4-BE49-F238E27FC236}">
+                <a16:creationId xmlns:a16="http://schemas.microsoft.com/office/drawing/2014/main" id="{F6E44AE7-CD9E-64DB-BCCE-23F9CA2462FA}"/>
+              </a:ext>
+            </a:extLst>
+          </p:cNvPr>
+          <p:cNvPicPr>
+            <a:picLocks noChangeAspect="1"/>
+          </p:cNvPicPr>
+          <p:nvPr/>
+        </p:nvPicPr>
+        <p:blipFill rotWithShape="1">
+          <a:blip r:embed="rId3"/>
+          <a:srcRect b="5764"/>
+          <a:stretch/>
+        </p:blipFill>
+        <p:spPr>
+          <a:xfrm>
+            <a:off x="2601132" y="542701"/>
+            <a:ext cx="6989736" cy="4916735"/>
+          </a:xfrm>
+          <a:prstGeom prst="rect">
+            <a:avLst/>
+          </a:prstGeom>
+        </p:spPr>
+      </p:pic>
+      <p:sp>
+        <p:nvSpPr>
+          <p:cNvPr id="13" name="Rectangle 12">
+            <a:extLst>
+              <a:ext uri="{FF2B5EF4-FFF2-40B4-BE49-F238E27FC236}">
+                <a16:creationId xmlns:a16="http://schemas.microsoft.com/office/drawing/2014/main" id="{7EFBB348-0D05-2507-3D87-878B290D74FF}"/>
+              </a:ext>
+            </a:extLst>
+          </p:cNvPr>
+          <p:cNvSpPr/>
+          <p:nvPr/>
+        </p:nvSpPr>
+        <p:spPr>
+          <a:xfrm>
+            <a:off x="2720340" y="689316"/>
+            <a:ext cx="693420" cy="342900"/>
+          </a:xfrm>
+          <a:prstGeom prst="rect">
+            <a:avLst/>
+          </a:prstGeom>
+          <a:solidFill>
+            <a:srgbClr val="F2F2F2"/>
+          </a:solidFill>
+          <a:ln>
+            <a:noFill/>
+          </a:ln>
+        </p:spPr>
+        <p:style>
+          <a:lnRef idx="2">
+            <a:schemeClr val="accent1">
+              <a:shade val="15000"/>
+            </a:schemeClr>
+          </a:lnRef>
+          <a:fillRef idx="1">
+            <a:schemeClr val="accent1"/>
+          </a:fillRef>
+          <a:effectRef idx="0">
+            <a:schemeClr val="accent1"/>
+          </a:effectRef>
+          <a:fontRef idx="minor">
+            <a:schemeClr val="lt1"/>
+          </a:fontRef>
+        </p:style>
+        <p:txBody>
+          <a:bodyPr rtlCol="0" anchor="ctr"/>
+          <a:lstStyle/>
+          <a:p>
+            <a:pPr algn="ctr"/>
+            <a:endParaRPr lang="en-US"/>
+          </a:p>
+        </p:txBody>
+      </p:sp>
+      <p:sp>
+        <p:nvSpPr>
+          <p:cNvPr id="14" name="Rectangle 13">
+            <a:extLst>
+              <a:ext uri="{FF2B5EF4-FFF2-40B4-BE49-F238E27FC236}">
+                <a16:creationId xmlns:a16="http://schemas.microsoft.com/office/drawing/2014/main" id="{00A362D1-E10A-3D3D-EF99-B1E41D9B0214}"/>
+              </a:ext>
+            </a:extLst>
+          </p:cNvPr>
+          <p:cNvSpPr/>
+          <p:nvPr/>
+        </p:nvSpPr>
+        <p:spPr>
+          <a:xfrm>
+            <a:off x="2720340" y="1032216"/>
+            <a:ext cx="6870528" cy="281940"/>
+          </a:xfrm>
+          <a:prstGeom prst="rect">
+            <a:avLst/>
+          </a:prstGeom>
+          <a:solidFill>
+            <a:srgbClr val="F2F2F2"/>
+          </a:solidFill>
+          <a:ln>
+            <a:noFill/>
+          </a:ln>
+        </p:spPr>
+        <p:style>
+          <a:lnRef idx="2">
+            <a:schemeClr val="accent1">
+              <a:shade val="15000"/>
+            </a:schemeClr>
+          </a:lnRef>
+          <a:fillRef idx="1">
+            <a:schemeClr val="accent1"/>
+          </a:fillRef>
+          <a:effectRef idx="0">
+            <a:schemeClr val="accent1"/>
+          </a:effectRef>
+          <a:fontRef idx="minor">
+            <a:schemeClr val="lt1"/>
+          </a:fontRef>
+        </p:style>
+        <p:txBody>
+          <a:bodyPr rtlCol="0" anchor="ctr"/>
+          <a:lstStyle/>
+          <a:p>
+            <a:pPr algn="ctr"/>
+            <a:endParaRPr lang="en-US"/>
+          </a:p>
+        </p:txBody>
+      </p:sp>
+      <p:sp>
+        <p:nvSpPr>
+          <p:cNvPr id="15" name="Rectangle 14">
+            <a:extLst>
+              <a:ext uri="{FF2B5EF4-FFF2-40B4-BE49-F238E27FC236}">
+                <a16:creationId xmlns:a16="http://schemas.microsoft.com/office/drawing/2014/main" id="{1F38BA90-2AAB-4199-C14E-10560E537C69}"/>
+              </a:ext>
+            </a:extLst>
+          </p:cNvPr>
+          <p:cNvSpPr/>
+          <p:nvPr/>
+        </p:nvSpPr>
+        <p:spPr>
+          <a:xfrm>
+            <a:off x="2720340" y="1324788"/>
+            <a:ext cx="3589020" cy="281940"/>
+          </a:xfrm>
+          <a:prstGeom prst="rect">
+            <a:avLst/>
+          </a:prstGeom>
+          <a:solidFill>
+            <a:srgbClr val="F2F2F2"/>
+          </a:solidFill>
+          <a:ln>
+            <a:noFill/>
+          </a:ln>
+        </p:spPr>
+        <p:style>
+          <a:lnRef idx="2">
+            <a:schemeClr val="accent1">
+              <a:shade val="15000"/>
+            </a:schemeClr>
+          </a:lnRef>
+          <a:fillRef idx="1">
+            <a:schemeClr val="accent1"/>
+          </a:fillRef>
+          <a:effectRef idx="0">
+            <a:schemeClr val="accent1"/>
+          </a:effectRef>
+          <a:fontRef idx="minor">
+            <a:schemeClr val="lt1"/>
+          </a:fontRef>
+        </p:style>
+        <p:txBody>
+          <a:bodyPr rtlCol="0" anchor="ctr"/>
+          <a:lstStyle/>
+          <a:p>
+            <a:pPr algn="ctr"/>
+            <a:endParaRPr lang="en-US"/>
+          </a:p>
+        </p:txBody>
+      </p:sp>
+      <p:sp>
+        <p:nvSpPr>
+          <p:cNvPr id="16" name="Rectangle 15">
+            <a:extLst>
+              <a:ext uri="{FF2B5EF4-FFF2-40B4-BE49-F238E27FC236}">
+                <a16:creationId xmlns:a16="http://schemas.microsoft.com/office/drawing/2014/main" id="{4ECDDBF2-6EDB-972D-B99D-0743E551754C}"/>
+              </a:ext>
+            </a:extLst>
+          </p:cNvPr>
+          <p:cNvSpPr/>
+          <p:nvPr/>
+        </p:nvSpPr>
+        <p:spPr>
+          <a:xfrm>
+            <a:off x="2720340" y="1645429"/>
+            <a:ext cx="2575560" cy="281940"/>
+          </a:xfrm>
+          <a:prstGeom prst="rect">
+            <a:avLst/>
+          </a:prstGeom>
+          <a:solidFill>
+            <a:srgbClr val="F2F2F2"/>
+          </a:solidFill>
+          <a:ln>
+            <a:noFill/>
+          </a:ln>
+        </p:spPr>
+        <p:style>
+          <a:lnRef idx="2">
+            <a:schemeClr val="accent1">
+              <a:shade val="15000"/>
+            </a:schemeClr>
+          </a:lnRef>
+          <a:fillRef idx="1">
+            <a:schemeClr val="accent1"/>
+          </a:fillRef>
+          <a:effectRef idx="0">
+            <a:schemeClr val="accent1"/>
+          </a:effectRef>
+          <a:fontRef idx="minor">
+            <a:schemeClr val="lt1"/>
+          </a:fontRef>
+        </p:style>
+        <p:txBody>
+          <a:bodyPr rtlCol="0" anchor="ctr"/>
+          <a:lstStyle/>
+          <a:p>
+            <a:pPr algn="ctr"/>
+            <a:endParaRPr lang="en-US"/>
+          </a:p>
+        </p:txBody>
+      </p:sp>
+      <p:sp>
+        <p:nvSpPr>
+          <p:cNvPr id="17" name="Rectangle 16">
+            <a:extLst>
+              <a:ext uri="{FF2B5EF4-FFF2-40B4-BE49-F238E27FC236}">
+                <a16:creationId xmlns:a16="http://schemas.microsoft.com/office/drawing/2014/main" id="{7A8A9DBB-1465-3525-4DD9-C621968FE67D}"/>
+              </a:ext>
+            </a:extLst>
+          </p:cNvPr>
+          <p:cNvSpPr/>
+          <p:nvPr/>
+        </p:nvSpPr>
+        <p:spPr>
+          <a:xfrm>
+            <a:off x="2720340" y="1996781"/>
+            <a:ext cx="3589020" cy="281940"/>
+          </a:xfrm>
+          <a:prstGeom prst="rect">
+            <a:avLst/>
+          </a:prstGeom>
+          <a:solidFill>
+            <a:srgbClr val="F2F2F2"/>
+          </a:solidFill>
+          <a:ln>
+            <a:noFill/>
+          </a:ln>
+        </p:spPr>
+        <p:style>
+          <a:lnRef idx="2">
+            <a:schemeClr val="accent1">
+              <a:shade val="15000"/>
+            </a:schemeClr>
+          </a:lnRef>
+          <a:fillRef idx="1">
+            <a:schemeClr val="accent1"/>
+          </a:fillRef>
+          <a:effectRef idx="0">
+            <a:schemeClr val="accent1"/>
+          </a:effectRef>
+          <a:fontRef idx="minor">
+            <a:schemeClr val="lt1"/>
+          </a:fontRef>
+        </p:style>
+        <p:txBody>
+          <a:bodyPr rtlCol="0" anchor="ctr"/>
+          <a:lstStyle/>
+          <a:p>
+            <a:pPr algn="ctr"/>
+            <a:endParaRPr lang="en-US"/>
+          </a:p>
+        </p:txBody>
+      </p:sp>
+      <p:sp>
+        <p:nvSpPr>
+          <p:cNvPr id="19" name="Rectangle 18">
+            <a:extLst>
+              <a:ext uri="{FF2B5EF4-FFF2-40B4-BE49-F238E27FC236}">
+                <a16:creationId xmlns:a16="http://schemas.microsoft.com/office/drawing/2014/main" id="{4A6CE67B-AF9E-6C76-FB40-D301D32B6A70}"/>
+              </a:ext>
+            </a:extLst>
+          </p:cNvPr>
+          <p:cNvSpPr/>
+          <p:nvPr/>
+        </p:nvSpPr>
+        <p:spPr>
+          <a:xfrm>
+            <a:off x="2720340" y="2296973"/>
+            <a:ext cx="4427220" cy="281940"/>
+          </a:xfrm>
+          <a:prstGeom prst="rect">
+            <a:avLst/>
+          </a:prstGeom>
+          <a:solidFill>
+            <a:srgbClr val="F2F2F2"/>
+          </a:solidFill>
+          <a:ln>
+            <a:noFill/>
+          </a:ln>
+        </p:spPr>
+        <p:style>
+          <a:lnRef idx="2">
+            <a:schemeClr val="accent1">
+              <a:shade val="15000"/>
+            </a:schemeClr>
+          </a:lnRef>
+          <a:fillRef idx="1">
+            <a:schemeClr val="accent1"/>
+          </a:fillRef>
+          <a:effectRef idx="0">
+            <a:schemeClr val="accent1"/>
+          </a:effectRef>
+          <a:fontRef idx="minor">
+            <a:schemeClr val="lt1"/>
+          </a:fontRef>
+        </p:style>
+        <p:txBody>
+          <a:bodyPr rtlCol="0" anchor="ctr"/>
+          <a:lstStyle/>
+          <a:p>
+            <a:pPr algn="ctr"/>
+            <a:endParaRPr lang="en-US"/>
+          </a:p>
+        </p:txBody>
+      </p:sp>
+      <p:sp>
+        <p:nvSpPr>
+          <p:cNvPr id="20" name="Rectangle 19">
+            <a:extLst>
+              <a:ext uri="{FF2B5EF4-FFF2-40B4-BE49-F238E27FC236}">
+                <a16:creationId xmlns:a16="http://schemas.microsoft.com/office/drawing/2014/main" id="{44F94C92-E69C-5DBF-7E70-D34279753D47}"/>
+              </a:ext>
+            </a:extLst>
+          </p:cNvPr>
+          <p:cNvSpPr/>
+          <p:nvPr/>
+        </p:nvSpPr>
+        <p:spPr>
+          <a:xfrm>
+            <a:off x="2720340" y="2597165"/>
+            <a:ext cx="4427220" cy="281940"/>
+          </a:xfrm>
+          <a:prstGeom prst="rect">
+            <a:avLst/>
+          </a:prstGeom>
+          <a:solidFill>
+            <a:srgbClr val="F2F2F2"/>
+          </a:solidFill>
+          <a:ln>
+            <a:noFill/>
+          </a:ln>
+        </p:spPr>
+        <p:style>
+          <a:lnRef idx="2">
+            <a:schemeClr val="accent1">
+              <a:shade val="15000"/>
+            </a:schemeClr>
+          </a:lnRef>
+          <a:fillRef idx="1">
+            <a:schemeClr val="accent1"/>
+          </a:fillRef>
+          <a:effectRef idx="0">
+            <a:schemeClr val="accent1"/>
+          </a:effectRef>
+          <a:fontRef idx="minor">
+            <a:schemeClr val="lt1"/>
+          </a:fontRef>
+        </p:style>
+        <p:txBody>
+          <a:bodyPr rtlCol="0" anchor="ctr"/>
+          <a:lstStyle/>
+          <a:p>
+            <a:pPr algn="ctr"/>
+            <a:endParaRPr lang="en-US"/>
+          </a:p>
+        </p:txBody>
+      </p:sp>
+      <p:sp>
+        <p:nvSpPr>
+          <p:cNvPr id="21" name="Rectangle 20">
+            <a:extLst>
+              <a:ext uri="{FF2B5EF4-FFF2-40B4-BE49-F238E27FC236}">
+                <a16:creationId xmlns:a16="http://schemas.microsoft.com/office/drawing/2014/main" id="{9EDD74C9-793B-EB15-ECF3-3E85DB54629D}"/>
+              </a:ext>
+            </a:extLst>
+          </p:cNvPr>
+          <p:cNvSpPr/>
+          <p:nvPr/>
+        </p:nvSpPr>
+        <p:spPr>
+          <a:xfrm>
+            <a:off x="2720340" y="2917806"/>
+            <a:ext cx="2575560" cy="281940"/>
+          </a:xfrm>
+          <a:prstGeom prst="rect">
+            <a:avLst/>
+          </a:prstGeom>
+          <a:solidFill>
+            <a:srgbClr val="F2F2F2"/>
+          </a:solidFill>
+          <a:ln>
+            <a:noFill/>
+          </a:ln>
+        </p:spPr>
+        <p:style>
+          <a:lnRef idx="2">
+            <a:schemeClr val="accent1">
+              <a:shade val="15000"/>
+            </a:schemeClr>
+          </a:lnRef>
+          <a:fillRef idx="1">
+            <a:schemeClr val="accent1"/>
+          </a:fillRef>
+          <a:effectRef idx="0">
+            <a:schemeClr val="accent1"/>
+          </a:effectRef>
+          <a:fontRef idx="minor">
+            <a:schemeClr val="lt1"/>
+          </a:fontRef>
+        </p:style>
+        <p:txBody>
+          <a:bodyPr rtlCol="0" anchor="ctr"/>
+          <a:lstStyle/>
+          <a:p>
+            <a:pPr algn="ctr"/>
+            <a:endParaRPr lang="en-US"/>
+          </a:p>
+        </p:txBody>
+      </p:sp>
+      <p:sp>
+        <p:nvSpPr>
+          <p:cNvPr id="22" name="Rectangle 21">
+            <a:extLst>
+              <a:ext uri="{FF2B5EF4-FFF2-40B4-BE49-F238E27FC236}">
+                <a16:creationId xmlns:a16="http://schemas.microsoft.com/office/drawing/2014/main" id="{975C0DA8-16DD-E329-E258-36DC6ACE6527}"/>
+              </a:ext>
+            </a:extLst>
+          </p:cNvPr>
+          <p:cNvSpPr/>
+          <p:nvPr/>
+        </p:nvSpPr>
+        <p:spPr>
+          <a:xfrm>
+            <a:off x="2720340" y="3219808"/>
+            <a:ext cx="3070860" cy="281940"/>
+          </a:xfrm>
+          <a:prstGeom prst="rect">
+            <a:avLst/>
+          </a:prstGeom>
+          <a:solidFill>
+            <a:srgbClr val="F2F2F2"/>
+          </a:solidFill>
+          <a:ln>
+            <a:noFill/>
+          </a:ln>
+        </p:spPr>
+        <p:style>
+          <a:lnRef idx="2">
+            <a:schemeClr val="accent1">
+              <a:shade val="15000"/>
+            </a:schemeClr>
+          </a:lnRef>
+          <a:fillRef idx="1">
+            <a:schemeClr val="accent1"/>
+          </a:fillRef>
+          <a:effectRef idx="0">
+            <a:schemeClr val="accent1"/>
+          </a:effectRef>
+          <a:fontRef idx="minor">
+            <a:schemeClr val="lt1"/>
+          </a:fontRef>
+        </p:style>
+        <p:txBody>
+          <a:bodyPr rtlCol="0" anchor="ctr"/>
+          <a:lstStyle/>
+          <a:p>
+            <a:pPr algn="ctr"/>
+            <a:endParaRPr lang="en-US"/>
+          </a:p>
+        </p:txBody>
+      </p:sp>
+      <p:sp>
+        <p:nvSpPr>
+          <p:cNvPr id="23" name="Rectangle 22">
+            <a:extLst>
+              <a:ext uri="{FF2B5EF4-FFF2-40B4-BE49-F238E27FC236}">
+                <a16:creationId xmlns:a16="http://schemas.microsoft.com/office/drawing/2014/main" id="{6794C004-A33F-B3A6-818E-23A37CE23E94}"/>
+              </a:ext>
+            </a:extLst>
+          </p:cNvPr>
+          <p:cNvSpPr/>
+          <p:nvPr/>
+        </p:nvSpPr>
+        <p:spPr>
+          <a:xfrm>
+            <a:off x="2720340" y="3569350"/>
+            <a:ext cx="4549140" cy="281940"/>
+          </a:xfrm>
+          <a:prstGeom prst="rect">
+            <a:avLst/>
+          </a:prstGeom>
+          <a:solidFill>
+            <a:srgbClr val="F2F2F2"/>
+          </a:solidFill>
+          <a:ln>
+            <a:noFill/>
+          </a:ln>
+        </p:spPr>
+        <p:style>
+          <a:lnRef idx="2">
+            <a:schemeClr val="accent1">
+              <a:shade val="15000"/>
+            </a:schemeClr>
+          </a:lnRef>
+          <a:fillRef idx="1">
+            <a:schemeClr val="accent1"/>
+          </a:fillRef>
+          <a:effectRef idx="0">
+            <a:schemeClr val="accent1"/>
+          </a:effectRef>
+          <a:fontRef idx="minor">
+            <a:schemeClr val="lt1"/>
+          </a:fontRef>
+        </p:style>
+        <p:txBody>
+          <a:bodyPr rtlCol="0" anchor="ctr"/>
+          <a:lstStyle/>
+          <a:p>
+            <a:pPr algn="ctr"/>
+            <a:endParaRPr lang="en-US"/>
+          </a:p>
+        </p:txBody>
+      </p:sp>
+      <p:sp>
+        <p:nvSpPr>
+          <p:cNvPr id="24" name="Rectangle 23">
+            <a:extLst>
+              <a:ext uri="{FF2B5EF4-FFF2-40B4-BE49-F238E27FC236}">
+                <a16:creationId xmlns:a16="http://schemas.microsoft.com/office/drawing/2014/main" id="{B3BC14EF-31C8-DAE5-4DF7-D47B31C07DDA}"/>
+              </a:ext>
+            </a:extLst>
+          </p:cNvPr>
+          <p:cNvSpPr/>
+          <p:nvPr/>
+        </p:nvSpPr>
+        <p:spPr>
+          <a:xfrm>
+            <a:off x="2720340" y="3897516"/>
+            <a:ext cx="1318260" cy="281940"/>
+          </a:xfrm>
+          <a:prstGeom prst="rect">
+            <a:avLst/>
+          </a:prstGeom>
+          <a:solidFill>
+            <a:srgbClr val="F2F2F2"/>
+          </a:solidFill>
+          <a:ln>
+            <a:noFill/>
+          </a:ln>
+        </p:spPr>
+        <p:style>
+          <a:lnRef idx="2">
+            <a:schemeClr val="accent1">
+              <a:shade val="15000"/>
+            </a:schemeClr>
+          </a:lnRef>
+          <a:fillRef idx="1">
+            <a:schemeClr val="accent1"/>
+          </a:fillRef>
+          <a:effectRef idx="0">
+            <a:schemeClr val="accent1"/>
+          </a:effectRef>
+          <a:fontRef idx="minor">
+            <a:schemeClr val="lt1"/>
+          </a:fontRef>
+        </p:style>
+        <p:txBody>
+          <a:bodyPr rtlCol="0" anchor="ctr"/>
+          <a:lstStyle/>
+          <a:p>
+            <a:pPr algn="ctr"/>
+            <a:endParaRPr lang="en-US"/>
+          </a:p>
+        </p:txBody>
+      </p:sp>
+      <p:sp>
+        <p:nvSpPr>
+          <p:cNvPr id="25" name="Rectangle 24">
+            <a:extLst>
+              <a:ext uri="{FF2B5EF4-FFF2-40B4-BE49-F238E27FC236}">
+                <a16:creationId xmlns:a16="http://schemas.microsoft.com/office/drawing/2014/main" id="{681711B9-1B4A-2CCA-56C8-C2CD03F3BF01}"/>
+              </a:ext>
+            </a:extLst>
+          </p:cNvPr>
+          <p:cNvSpPr/>
+          <p:nvPr/>
+        </p:nvSpPr>
+        <p:spPr>
+          <a:xfrm>
+            <a:off x="2720340" y="4225356"/>
+            <a:ext cx="1066800" cy="281940"/>
+          </a:xfrm>
+          <a:prstGeom prst="rect">
+            <a:avLst/>
+          </a:prstGeom>
+          <a:solidFill>
+            <a:srgbClr val="F2F2F2"/>
+          </a:solidFill>
+          <a:ln>
+            <a:noFill/>
+          </a:ln>
+        </p:spPr>
+        <p:style>
+          <a:lnRef idx="2">
+            <a:schemeClr val="accent1">
+              <a:shade val="15000"/>
+            </a:schemeClr>
+          </a:lnRef>
+          <a:fillRef idx="1">
+            <a:schemeClr val="accent1"/>
+          </a:fillRef>
+          <a:effectRef idx="0">
+            <a:schemeClr val="accent1"/>
+          </a:effectRef>
+          <a:fontRef idx="minor">
+            <a:schemeClr val="lt1"/>
+          </a:fontRef>
+        </p:style>
+        <p:txBody>
+          <a:bodyPr rtlCol="0" anchor="ctr"/>
+          <a:lstStyle/>
+          <a:p>
+            <a:pPr algn="ctr"/>
+            <a:endParaRPr lang="en-US"/>
+          </a:p>
+        </p:txBody>
+      </p:sp>
+      <p:sp>
+        <p:nvSpPr>
+          <p:cNvPr id="26" name="Rectangle 25">
+            <a:extLst>
+              <a:ext uri="{FF2B5EF4-FFF2-40B4-BE49-F238E27FC236}">
+                <a16:creationId xmlns:a16="http://schemas.microsoft.com/office/drawing/2014/main" id="{6A516439-AE69-BD52-2769-2A969382612B}"/>
+              </a:ext>
+            </a:extLst>
+          </p:cNvPr>
+          <p:cNvSpPr/>
+          <p:nvPr/>
+        </p:nvSpPr>
+        <p:spPr>
+          <a:xfrm>
+            <a:off x="2720340" y="4520476"/>
+            <a:ext cx="2575560" cy="281940"/>
+          </a:xfrm>
+          <a:prstGeom prst="rect">
+            <a:avLst/>
+          </a:prstGeom>
+          <a:solidFill>
+            <a:srgbClr val="F2F2F2"/>
+          </a:solidFill>
+          <a:ln>
+            <a:noFill/>
+          </a:ln>
+        </p:spPr>
+        <p:style>
+          <a:lnRef idx="2">
+            <a:schemeClr val="accent1">
+              <a:shade val="15000"/>
+            </a:schemeClr>
+          </a:lnRef>
+          <a:fillRef idx="1">
+            <a:schemeClr val="accent1"/>
+          </a:fillRef>
+          <a:effectRef idx="0">
+            <a:schemeClr val="accent1"/>
+          </a:effectRef>
+          <a:fontRef idx="minor">
+            <a:schemeClr val="lt1"/>
+          </a:fontRef>
+        </p:style>
+        <p:txBody>
+          <a:bodyPr rtlCol="0" anchor="ctr"/>
+          <a:lstStyle/>
+          <a:p>
+            <a:pPr algn="ctr"/>
+            <a:endParaRPr lang="en-US"/>
+          </a:p>
+        </p:txBody>
+      </p:sp>
+      <p:sp>
+        <p:nvSpPr>
+          <p:cNvPr id="27" name="Rectangle 26">
+            <a:extLst>
+              <a:ext uri="{FF2B5EF4-FFF2-40B4-BE49-F238E27FC236}">
+                <a16:creationId xmlns:a16="http://schemas.microsoft.com/office/drawing/2014/main" id="{4FDF833B-2082-8386-6898-563AAB6FCF3F}"/>
+              </a:ext>
+            </a:extLst>
+          </p:cNvPr>
+          <p:cNvSpPr/>
+          <p:nvPr/>
+        </p:nvSpPr>
+        <p:spPr>
+          <a:xfrm>
+            <a:off x="2720340" y="4810036"/>
+            <a:ext cx="2415540" cy="281940"/>
+          </a:xfrm>
+          <a:prstGeom prst="rect">
+            <a:avLst/>
+          </a:prstGeom>
+          <a:solidFill>
+            <a:srgbClr val="F2F2F2"/>
+          </a:solidFill>
+          <a:ln>
+            <a:noFill/>
+          </a:ln>
+        </p:spPr>
+        <p:style>
+          <a:lnRef idx="2">
+            <a:schemeClr val="accent1">
+              <a:shade val="15000"/>
+            </a:schemeClr>
+          </a:lnRef>
+          <a:fillRef idx="1">
+            <a:schemeClr val="accent1"/>
+          </a:fillRef>
+          <a:effectRef idx="0">
+            <a:schemeClr val="accent1"/>
+          </a:effectRef>
+          <a:fontRef idx="minor">
+            <a:schemeClr val="lt1"/>
+          </a:fontRef>
+        </p:style>
+        <p:txBody>
+          <a:bodyPr rtlCol="0" anchor="ctr"/>
+          <a:lstStyle/>
+          <a:p>
+            <a:pPr algn="ctr"/>
+            <a:endParaRPr lang="en-US"/>
+          </a:p>
+        </p:txBody>
+      </p:sp>
+      <p:sp>
+        <p:nvSpPr>
+          <p:cNvPr id="28" name="Rectangle 27">
+            <a:extLst>
+              <a:ext uri="{FF2B5EF4-FFF2-40B4-BE49-F238E27FC236}">
+                <a16:creationId xmlns:a16="http://schemas.microsoft.com/office/drawing/2014/main" id="{6F23C824-609E-55D5-249A-1AB78E886674}"/>
+              </a:ext>
+            </a:extLst>
+          </p:cNvPr>
+          <p:cNvSpPr/>
+          <p:nvPr/>
+        </p:nvSpPr>
+        <p:spPr>
+          <a:xfrm>
+            <a:off x="2720340" y="5118337"/>
+            <a:ext cx="609600" cy="281940"/>
+          </a:xfrm>
+          <a:prstGeom prst="rect">
+            <a:avLst/>
+          </a:prstGeom>
+          <a:solidFill>
+            <a:srgbClr val="F2F2F2"/>
+          </a:solidFill>
+          <a:ln>
+            <a:noFill/>
+          </a:ln>
+        </p:spPr>
+        <p:style>
+          <a:lnRef idx="2">
+            <a:schemeClr val="accent1">
+              <a:shade val="15000"/>
+            </a:schemeClr>
+          </a:lnRef>
+          <a:fillRef idx="1">
+            <a:schemeClr val="accent1"/>
+          </a:fillRef>
+          <a:effectRef idx="0">
+            <a:schemeClr val="accent1"/>
+          </a:effectRef>
+          <a:fontRef idx="minor">
+            <a:schemeClr val="lt1"/>
+          </a:fontRef>
+        </p:style>
+        <p:txBody>
+          <a:bodyPr rtlCol="0" anchor="ctr"/>
+          <a:lstStyle/>
+          <a:p>
+            <a:pPr algn="ctr"/>
+            <a:endParaRPr lang="en-US"/>
+          </a:p>
+        </p:txBody>
+      </p:sp>
+    </p:spTree>
+    <p:extLst>
+      <p:ext uri="{BB962C8B-B14F-4D97-AF65-F5344CB8AC3E}">
+        <p14:creationId xmlns:p14="http://schemas.microsoft.com/office/powerpoint/2010/main" val="2331376849"/>
+      </p:ext>
+    </p:extLst>
+  </p:cSld>
+  <p:clrMapOvr>
+    <a:masterClrMapping/>
+  </p:clrMapOvr>
+  <mc:AlternateContent xmlns:mc="http://schemas.openxmlformats.org/markup-compatibility/2006" xmlns:p159="http://schemas.microsoft.com/office/powerpoint/2015/09/main">
+    <mc:Choice Requires="p159">
+      <p:transition spd="slow" advTm="6000">
+        <p159:morph option="byObject"/>
+      </p:transition>
+    </mc:Choice>
+    <mc:Fallback xmlns="">
+      <p:transition spd="slow" advTm="6000">
+        <p:fade/>
+      </p:transition>
+    </mc:Fallback>
+  </mc:AlternateContent>
+  <p:timing>
+    <p:tnLst>
+      <p:par>
+        <p:cTn id="1" dur="indefinite" restart="never" nodeType="tmRoot">
+          <p:childTnLst>
+            <p:seq concurrent="1" nextAc="seek">
+              <p:cTn id="2" dur="indefinite" nodeType="mainSeq">
+                <p:childTnLst>
+                  <p:par>
+                    <p:cTn id="3" fill="hold">
+                      <p:stCondLst>
+                        <p:cond delay="indefinite"/>
+                        <p:cond evt="onBegin" delay="0">
+                          <p:tn val="2"/>
+                        </p:cond>
+                      </p:stCondLst>
+                      <p:childTnLst>
+                        <p:par>
+                          <p:cTn id="4" fill="hold">
+                            <p:stCondLst>
+                              <p:cond delay="0"/>
+                            </p:stCondLst>
+                            <p:childTnLst>
+                              <p:par>
+                                <p:cTn id="5" presetID="10" presetClass="entr" presetSubtype="0" fill="hold" nodeType="withEffect">
+                                  <p:stCondLst>
+                                    <p:cond delay="0"/>
+                                  </p:stCondLst>
+                                  <p:childTnLst>
+                                    <p:set>
+                                      <p:cBhvr>
+                                        <p:cTn id="6" dur="1" fill="hold">
+                                          <p:stCondLst>
+                                            <p:cond delay="0"/>
+                                          </p:stCondLst>
+                                        </p:cTn>
+                                        <p:tgtEl>
+                                          <p:spTgt spid="9"/>
+                                        </p:tgtEl>
+                                        <p:attrNameLst>
+                                          <p:attrName>style.visibility</p:attrName>
+                                        </p:attrNameLst>
+                                      </p:cBhvr>
+                                      <p:to>
+                                        <p:strVal val="visible"/>
+                                      </p:to>
+                                    </p:set>
+                                    <p:animEffect transition="in" filter="fade">
+                                      <p:cBhvr>
+                                        <p:cTn id="7" dur="500"/>
+                                        <p:tgtEl>
+                                          <p:spTgt spid="9"/>
+                                        </p:tgtEl>
+                                      </p:cBhvr>
+                                    </p:animEffect>
+                                  </p:childTnLst>
+                                </p:cTn>
+                              </p:par>
+                            </p:childTnLst>
+                          </p:cTn>
+                        </p:par>
+                        <p:par>
+                          <p:cTn id="8" fill="hold">
+                            <p:stCondLst>
+                              <p:cond delay="500"/>
+                            </p:stCondLst>
+                            <p:childTnLst>
+                              <p:par>
+                                <p:cTn id="9" presetID="12" presetClass="exit" presetSubtype="2" fill="hold" grpId="0" nodeType="afterEffect">
+                                  <p:stCondLst>
+                                    <p:cond delay="0"/>
+                                  </p:stCondLst>
+                                  <p:childTnLst>
+                                    <p:anim calcmode="lin" valueType="num">
+                                      <p:cBhvr additive="base">
+                                        <p:cTn id="10" dur="200"/>
+                                        <p:tgtEl>
+                                          <p:spTgt spid="13"/>
+                                        </p:tgtEl>
+                                        <p:attrNameLst>
+                                          <p:attrName>ppt_x</p:attrName>
+                                        </p:attrNameLst>
+                                      </p:cBhvr>
+                                      <p:tavLst>
+                                        <p:tav tm="0">
+                                          <p:val>
+                                            <p:strVal val="#ppt_x"/>
+                                          </p:val>
+                                        </p:tav>
+                                        <p:tav tm="100000">
+                                          <p:val>
+                                            <p:strVal val="#ppt_x+#ppt_w*1.125000"/>
+                                          </p:val>
+                                        </p:tav>
+                                      </p:tavLst>
+                                    </p:anim>
+                                    <p:animEffect transition="out" filter="wipe(right)">
+                                      <p:cBhvr>
+                                        <p:cTn id="11" dur="200"/>
+                                        <p:tgtEl>
+                                          <p:spTgt spid="13"/>
+                                        </p:tgtEl>
+                                      </p:cBhvr>
+                                    </p:animEffect>
+                                    <p:set>
+                                      <p:cBhvr>
+                                        <p:cTn id="12" dur="1" fill="hold">
+                                          <p:stCondLst>
+                                            <p:cond delay="199"/>
+                                          </p:stCondLst>
+                                        </p:cTn>
+                                        <p:tgtEl>
+                                          <p:spTgt spid="13"/>
+                                        </p:tgtEl>
+                                        <p:attrNameLst>
+                                          <p:attrName>style.visibility</p:attrName>
+                                        </p:attrNameLst>
+                                      </p:cBhvr>
+                                      <p:to>
+                                        <p:strVal val="hidden"/>
+                                      </p:to>
+                                    </p:set>
+                                  </p:childTnLst>
+                                </p:cTn>
+                              </p:par>
+                            </p:childTnLst>
+                          </p:cTn>
+                        </p:par>
+                        <p:par>
+                          <p:cTn id="13" fill="hold">
+                            <p:stCondLst>
+                              <p:cond delay="700"/>
+                            </p:stCondLst>
+                            <p:childTnLst>
+                              <p:par>
+                                <p:cTn id="14" presetID="12" presetClass="exit" presetSubtype="2" fill="hold" grpId="0" nodeType="afterEffect">
+                                  <p:stCondLst>
+                                    <p:cond delay="0"/>
+                                  </p:stCondLst>
+                                  <p:childTnLst>
+                                    <p:anim calcmode="lin" valueType="num">
+                                      <p:cBhvr additive="base">
+                                        <p:cTn id="15" dur="200"/>
+                                        <p:tgtEl>
+                                          <p:spTgt spid="14"/>
+                                        </p:tgtEl>
+                                        <p:attrNameLst>
+                                          <p:attrName>ppt_x</p:attrName>
+                                        </p:attrNameLst>
+                                      </p:cBhvr>
+                                      <p:tavLst>
+                                        <p:tav tm="0">
+                                          <p:val>
+                                            <p:strVal val="#ppt_x"/>
+                                          </p:val>
+                                        </p:tav>
+                                        <p:tav tm="100000">
+                                          <p:val>
+                                            <p:strVal val="#ppt_x+#ppt_w*1.125000"/>
+                                          </p:val>
+                                        </p:tav>
+                                      </p:tavLst>
+                                    </p:anim>
+                                    <p:animEffect transition="out" filter="wipe(right)">
+                                      <p:cBhvr>
+                                        <p:cTn id="16" dur="200"/>
+                                        <p:tgtEl>
+                                          <p:spTgt spid="14"/>
+                                        </p:tgtEl>
+                                      </p:cBhvr>
+                                    </p:animEffect>
+                                    <p:set>
+                                      <p:cBhvr>
+                                        <p:cTn id="17" dur="1" fill="hold">
+                                          <p:stCondLst>
+                                            <p:cond delay="199"/>
+                                          </p:stCondLst>
+                                        </p:cTn>
+                                        <p:tgtEl>
+                                          <p:spTgt spid="14"/>
+                                        </p:tgtEl>
+                                        <p:attrNameLst>
+                                          <p:attrName>style.visibility</p:attrName>
+                                        </p:attrNameLst>
+                                      </p:cBhvr>
+                                      <p:to>
+                                        <p:strVal val="hidden"/>
+                                      </p:to>
+                                    </p:set>
+                                  </p:childTnLst>
+                                </p:cTn>
+                              </p:par>
+                            </p:childTnLst>
+                          </p:cTn>
+                        </p:par>
+                        <p:par>
+                          <p:cTn id="18" fill="hold">
+                            <p:stCondLst>
+                              <p:cond delay="900"/>
+                            </p:stCondLst>
+                            <p:childTnLst>
+                              <p:par>
+                                <p:cTn id="19" presetID="12" presetClass="exit" presetSubtype="2" fill="hold" grpId="0" nodeType="afterEffect">
+                                  <p:stCondLst>
+                                    <p:cond delay="0"/>
+                                  </p:stCondLst>
+                                  <p:childTnLst>
+                                    <p:anim calcmode="lin" valueType="num">
+                                      <p:cBhvr additive="base">
+                                        <p:cTn id="20" dur="200"/>
+                                        <p:tgtEl>
+                                          <p:spTgt spid="15"/>
+                                        </p:tgtEl>
+                                        <p:attrNameLst>
+                                          <p:attrName>ppt_x</p:attrName>
+                                        </p:attrNameLst>
+                                      </p:cBhvr>
+                                      <p:tavLst>
+                                        <p:tav tm="0">
+                                          <p:val>
+                                            <p:strVal val="#ppt_x"/>
+                                          </p:val>
+                                        </p:tav>
+                                        <p:tav tm="100000">
+                                          <p:val>
+                                            <p:strVal val="#ppt_x+#ppt_w*1.125000"/>
+                                          </p:val>
+                                        </p:tav>
+                                      </p:tavLst>
+                                    </p:anim>
+                                    <p:animEffect transition="out" filter="wipe(right)">
+                                      <p:cBhvr>
+                                        <p:cTn id="21" dur="200"/>
+                                        <p:tgtEl>
+                                          <p:spTgt spid="15"/>
+                                        </p:tgtEl>
+                                      </p:cBhvr>
+                                    </p:animEffect>
+                                    <p:set>
+                                      <p:cBhvr>
+                                        <p:cTn id="22" dur="1" fill="hold">
+                                          <p:stCondLst>
+                                            <p:cond delay="199"/>
+                                          </p:stCondLst>
+                                        </p:cTn>
+                                        <p:tgtEl>
+                                          <p:spTgt spid="15"/>
+                                        </p:tgtEl>
+                                        <p:attrNameLst>
+                                          <p:attrName>style.visibility</p:attrName>
+                                        </p:attrNameLst>
+                                      </p:cBhvr>
+                                      <p:to>
+                                        <p:strVal val="hidden"/>
+                                      </p:to>
+                                    </p:set>
+                                  </p:childTnLst>
+                                </p:cTn>
+                              </p:par>
+                            </p:childTnLst>
+                          </p:cTn>
+                        </p:par>
+                        <p:par>
+                          <p:cTn id="23" fill="hold">
+                            <p:stCondLst>
+                              <p:cond delay="1100"/>
+                            </p:stCondLst>
+                            <p:childTnLst>
+                              <p:par>
+                                <p:cTn id="24" presetID="12" presetClass="exit" presetSubtype="2" fill="hold" grpId="0" nodeType="afterEffect">
+                                  <p:stCondLst>
+                                    <p:cond delay="0"/>
+                                  </p:stCondLst>
+                                  <p:childTnLst>
+                                    <p:anim calcmode="lin" valueType="num">
+                                      <p:cBhvr additive="base">
+                                        <p:cTn id="25" dur="200"/>
+                                        <p:tgtEl>
+                                          <p:spTgt spid="16"/>
+                                        </p:tgtEl>
+                                        <p:attrNameLst>
+                                          <p:attrName>ppt_x</p:attrName>
+                                        </p:attrNameLst>
+                                      </p:cBhvr>
+                                      <p:tavLst>
+                                        <p:tav tm="0">
+                                          <p:val>
+                                            <p:strVal val="#ppt_x"/>
+                                          </p:val>
+                                        </p:tav>
+                                        <p:tav tm="100000">
+                                          <p:val>
+                                            <p:strVal val="#ppt_x+#ppt_w*1.125000"/>
+                                          </p:val>
+                                        </p:tav>
+                                      </p:tavLst>
+                                    </p:anim>
+                                    <p:animEffect transition="out" filter="wipe(right)">
+                                      <p:cBhvr>
+                                        <p:cTn id="26" dur="200"/>
+                                        <p:tgtEl>
+                                          <p:spTgt spid="16"/>
+                                        </p:tgtEl>
+                                      </p:cBhvr>
+                                    </p:animEffect>
+                                    <p:set>
+                                      <p:cBhvr>
+                                        <p:cTn id="27" dur="1" fill="hold">
+                                          <p:stCondLst>
+                                            <p:cond delay="199"/>
+                                          </p:stCondLst>
+                                        </p:cTn>
+                                        <p:tgtEl>
+                                          <p:spTgt spid="16"/>
+                                        </p:tgtEl>
+                                        <p:attrNameLst>
+                                          <p:attrName>style.visibility</p:attrName>
+                                        </p:attrNameLst>
+                                      </p:cBhvr>
+                                      <p:to>
+                                        <p:strVal val="hidden"/>
+                                      </p:to>
+                                    </p:set>
+                                  </p:childTnLst>
+                                </p:cTn>
+                              </p:par>
+                            </p:childTnLst>
+                          </p:cTn>
+                        </p:par>
+                        <p:par>
+                          <p:cTn id="28" fill="hold">
+                            <p:stCondLst>
+                              <p:cond delay="1300"/>
+                            </p:stCondLst>
+                            <p:childTnLst>
+                              <p:par>
+                                <p:cTn id="29" presetID="12" presetClass="exit" presetSubtype="2" fill="hold" grpId="0" nodeType="afterEffect">
+                                  <p:stCondLst>
+                                    <p:cond delay="0"/>
+                                  </p:stCondLst>
+                                  <p:childTnLst>
+                                    <p:anim calcmode="lin" valueType="num">
+                                      <p:cBhvr additive="base">
+                                        <p:cTn id="30" dur="200"/>
+                                        <p:tgtEl>
+                                          <p:spTgt spid="17"/>
+                                        </p:tgtEl>
+                                        <p:attrNameLst>
+                                          <p:attrName>ppt_x</p:attrName>
+                                        </p:attrNameLst>
+                                      </p:cBhvr>
+                                      <p:tavLst>
+                                        <p:tav tm="0">
+                                          <p:val>
+                                            <p:strVal val="#ppt_x"/>
+                                          </p:val>
+                                        </p:tav>
+                                        <p:tav tm="100000">
+                                          <p:val>
+                                            <p:strVal val="#ppt_x+#ppt_w*1.125000"/>
+                                          </p:val>
+                                        </p:tav>
+                                      </p:tavLst>
+                                    </p:anim>
+                                    <p:animEffect transition="out" filter="wipe(right)">
+                                      <p:cBhvr>
+                                        <p:cTn id="31" dur="200"/>
+                                        <p:tgtEl>
+                                          <p:spTgt spid="17"/>
+                                        </p:tgtEl>
+                                      </p:cBhvr>
+                                    </p:animEffect>
+                                    <p:set>
+                                      <p:cBhvr>
+                                        <p:cTn id="32" dur="1" fill="hold">
+                                          <p:stCondLst>
+                                            <p:cond delay="199"/>
+                                          </p:stCondLst>
+                                        </p:cTn>
+                                        <p:tgtEl>
+                                          <p:spTgt spid="17"/>
+                                        </p:tgtEl>
+                                        <p:attrNameLst>
+                                          <p:attrName>style.visibility</p:attrName>
+                                        </p:attrNameLst>
+                                      </p:cBhvr>
+                                      <p:to>
+                                        <p:strVal val="hidden"/>
+                                      </p:to>
+                                    </p:set>
+                                  </p:childTnLst>
+                                </p:cTn>
+                              </p:par>
+                            </p:childTnLst>
+                          </p:cTn>
+                        </p:par>
+                        <p:par>
+                          <p:cTn id="33" fill="hold">
+                            <p:stCondLst>
+                              <p:cond delay="1500"/>
+                            </p:stCondLst>
+                            <p:childTnLst>
+                              <p:par>
+                                <p:cTn id="34" presetID="12" presetClass="exit" presetSubtype="2" fill="hold" grpId="0" nodeType="afterEffect">
+                                  <p:stCondLst>
+                                    <p:cond delay="0"/>
+                                  </p:stCondLst>
+                                  <p:childTnLst>
+                                    <p:anim calcmode="lin" valueType="num">
+                                      <p:cBhvr additive="base">
+                                        <p:cTn id="35" dur="200"/>
+                                        <p:tgtEl>
+                                          <p:spTgt spid="19"/>
+                                        </p:tgtEl>
+                                        <p:attrNameLst>
+                                          <p:attrName>ppt_x</p:attrName>
+                                        </p:attrNameLst>
+                                      </p:cBhvr>
+                                      <p:tavLst>
+                                        <p:tav tm="0">
+                                          <p:val>
+                                            <p:strVal val="#ppt_x"/>
+                                          </p:val>
+                                        </p:tav>
+                                        <p:tav tm="100000">
+                                          <p:val>
+                                            <p:strVal val="#ppt_x+#ppt_w*1.125000"/>
+                                          </p:val>
+                                        </p:tav>
+                                      </p:tavLst>
+                                    </p:anim>
+                                    <p:animEffect transition="out" filter="wipe(right)">
+                                      <p:cBhvr>
+                                        <p:cTn id="36" dur="200"/>
+                                        <p:tgtEl>
+                                          <p:spTgt spid="19"/>
+                                        </p:tgtEl>
+                                      </p:cBhvr>
+                                    </p:animEffect>
+                                    <p:set>
+                                      <p:cBhvr>
+                                        <p:cTn id="37" dur="1" fill="hold">
+                                          <p:stCondLst>
+                                            <p:cond delay="199"/>
+                                          </p:stCondLst>
+                                        </p:cTn>
+                                        <p:tgtEl>
+                                          <p:spTgt spid="19"/>
+                                        </p:tgtEl>
+                                        <p:attrNameLst>
+                                          <p:attrName>style.visibility</p:attrName>
+                                        </p:attrNameLst>
+                                      </p:cBhvr>
+                                      <p:to>
+                                        <p:strVal val="hidden"/>
+                                      </p:to>
+                                    </p:set>
+                                  </p:childTnLst>
+                                </p:cTn>
+                              </p:par>
+                            </p:childTnLst>
+                          </p:cTn>
+                        </p:par>
+                        <p:par>
+                          <p:cTn id="38" fill="hold">
+                            <p:stCondLst>
+                              <p:cond delay="1700"/>
+                            </p:stCondLst>
+                            <p:childTnLst>
+                              <p:par>
+                                <p:cTn id="39" presetID="12" presetClass="exit" presetSubtype="2" fill="hold" grpId="0" nodeType="afterEffect">
+                                  <p:stCondLst>
+                                    <p:cond delay="0"/>
+                                  </p:stCondLst>
+                                  <p:childTnLst>
+                                    <p:anim calcmode="lin" valueType="num">
+                                      <p:cBhvr additive="base">
+                                        <p:cTn id="40" dur="200"/>
+                                        <p:tgtEl>
+                                          <p:spTgt spid="20"/>
+                                        </p:tgtEl>
+                                        <p:attrNameLst>
+                                          <p:attrName>ppt_x</p:attrName>
+                                        </p:attrNameLst>
+                                      </p:cBhvr>
+                                      <p:tavLst>
+                                        <p:tav tm="0">
+                                          <p:val>
+                                            <p:strVal val="#ppt_x"/>
+                                          </p:val>
+                                        </p:tav>
+                                        <p:tav tm="100000">
+                                          <p:val>
+                                            <p:strVal val="#ppt_x+#ppt_w*1.125000"/>
+                                          </p:val>
+                                        </p:tav>
+                                      </p:tavLst>
+                                    </p:anim>
+                                    <p:animEffect transition="out" filter="wipe(right)">
+                                      <p:cBhvr>
+                                        <p:cTn id="41" dur="200"/>
+                                        <p:tgtEl>
+                                          <p:spTgt spid="20"/>
+                                        </p:tgtEl>
+                                      </p:cBhvr>
+                                    </p:animEffect>
+                                    <p:set>
+                                      <p:cBhvr>
+                                        <p:cTn id="42" dur="1" fill="hold">
+                                          <p:stCondLst>
+                                            <p:cond delay="199"/>
+                                          </p:stCondLst>
+                                        </p:cTn>
+                                        <p:tgtEl>
+                                          <p:spTgt spid="20"/>
+                                        </p:tgtEl>
+                                        <p:attrNameLst>
+                                          <p:attrName>style.visibility</p:attrName>
+                                        </p:attrNameLst>
+                                      </p:cBhvr>
+                                      <p:to>
+                                        <p:strVal val="hidden"/>
+                                      </p:to>
+                                    </p:set>
+                                  </p:childTnLst>
+                                </p:cTn>
+                              </p:par>
+                            </p:childTnLst>
+                          </p:cTn>
+                        </p:par>
+                        <p:par>
+                          <p:cTn id="43" fill="hold">
+                            <p:stCondLst>
+                              <p:cond delay="1900"/>
+                            </p:stCondLst>
+                            <p:childTnLst>
+                              <p:par>
+                                <p:cTn id="44" presetID="12" presetClass="exit" presetSubtype="2" fill="hold" grpId="0" nodeType="afterEffect">
+                                  <p:stCondLst>
+                                    <p:cond delay="0"/>
+                                  </p:stCondLst>
+                                  <p:childTnLst>
+                                    <p:anim calcmode="lin" valueType="num">
+                                      <p:cBhvr additive="base">
+                                        <p:cTn id="45" dur="200"/>
+                                        <p:tgtEl>
+                                          <p:spTgt spid="21"/>
+                                        </p:tgtEl>
+                                        <p:attrNameLst>
+                                          <p:attrName>ppt_x</p:attrName>
+                                        </p:attrNameLst>
+                                      </p:cBhvr>
+                                      <p:tavLst>
+                                        <p:tav tm="0">
+                                          <p:val>
+                                            <p:strVal val="#ppt_x"/>
+                                          </p:val>
+                                        </p:tav>
+                                        <p:tav tm="100000">
+                                          <p:val>
+                                            <p:strVal val="#ppt_x+#ppt_w*1.125000"/>
+                                          </p:val>
+                                        </p:tav>
+                                      </p:tavLst>
+                                    </p:anim>
+                                    <p:animEffect transition="out" filter="wipe(right)">
+                                      <p:cBhvr>
+                                        <p:cTn id="46" dur="200"/>
+                                        <p:tgtEl>
+                                          <p:spTgt spid="21"/>
+                                        </p:tgtEl>
+                                      </p:cBhvr>
+                                    </p:animEffect>
+                                    <p:set>
+                                      <p:cBhvr>
+                                        <p:cTn id="47" dur="1" fill="hold">
+                                          <p:stCondLst>
+                                            <p:cond delay="199"/>
+                                          </p:stCondLst>
+                                        </p:cTn>
+                                        <p:tgtEl>
+                                          <p:spTgt spid="21"/>
+                                        </p:tgtEl>
+                                        <p:attrNameLst>
+                                          <p:attrName>style.visibility</p:attrName>
+                                        </p:attrNameLst>
+                                      </p:cBhvr>
+                                      <p:to>
+                                        <p:strVal val="hidden"/>
+                                      </p:to>
+                                    </p:set>
+                                  </p:childTnLst>
+                                </p:cTn>
+                              </p:par>
+                            </p:childTnLst>
+                          </p:cTn>
+                        </p:par>
+                        <p:par>
+                          <p:cTn id="48" fill="hold">
+                            <p:stCondLst>
+                              <p:cond delay="2100"/>
+                            </p:stCondLst>
+                            <p:childTnLst>
+                              <p:par>
+                                <p:cTn id="49" presetID="12" presetClass="exit" presetSubtype="2" fill="hold" grpId="0" nodeType="afterEffect">
+                                  <p:stCondLst>
+                                    <p:cond delay="0"/>
+                                  </p:stCondLst>
+                                  <p:childTnLst>
+                                    <p:anim calcmode="lin" valueType="num">
+                                      <p:cBhvr additive="base">
+                                        <p:cTn id="50" dur="200"/>
+                                        <p:tgtEl>
+                                          <p:spTgt spid="22"/>
+                                        </p:tgtEl>
+                                        <p:attrNameLst>
+                                          <p:attrName>ppt_x</p:attrName>
+                                        </p:attrNameLst>
+                                      </p:cBhvr>
+                                      <p:tavLst>
+                                        <p:tav tm="0">
+                                          <p:val>
+                                            <p:strVal val="#ppt_x"/>
+                                          </p:val>
+                                        </p:tav>
+                                        <p:tav tm="100000">
+                                          <p:val>
+                                            <p:strVal val="#ppt_x+#ppt_w*1.125000"/>
+                                          </p:val>
+                                        </p:tav>
+                                      </p:tavLst>
+                                    </p:anim>
+                                    <p:animEffect transition="out" filter="wipe(right)">
+                                      <p:cBhvr>
+                                        <p:cTn id="51" dur="200"/>
+                                        <p:tgtEl>
+                                          <p:spTgt spid="22"/>
+                                        </p:tgtEl>
+                                      </p:cBhvr>
+                                    </p:animEffect>
+                                    <p:set>
+                                      <p:cBhvr>
+                                        <p:cTn id="52" dur="1" fill="hold">
+                                          <p:stCondLst>
+                                            <p:cond delay="199"/>
+                                          </p:stCondLst>
+                                        </p:cTn>
+                                        <p:tgtEl>
+                                          <p:spTgt spid="22"/>
+                                        </p:tgtEl>
+                                        <p:attrNameLst>
+                                          <p:attrName>style.visibility</p:attrName>
+                                        </p:attrNameLst>
+                                      </p:cBhvr>
+                                      <p:to>
+                                        <p:strVal val="hidden"/>
+                                      </p:to>
+                                    </p:set>
+                                  </p:childTnLst>
+                                </p:cTn>
+                              </p:par>
+                            </p:childTnLst>
+                          </p:cTn>
+                        </p:par>
+                        <p:par>
+                          <p:cTn id="53" fill="hold">
+                            <p:stCondLst>
+                              <p:cond delay="2300"/>
+                            </p:stCondLst>
+                            <p:childTnLst>
+                              <p:par>
+                                <p:cTn id="54" presetID="12" presetClass="exit" presetSubtype="2" fill="hold" grpId="0" nodeType="afterEffect">
+                                  <p:stCondLst>
+                                    <p:cond delay="0"/>
+                                  </p:stCondLst>
+                                  <p:childTnLst>
+                                    <p:anim calcmode="lin" valueType="num">
+                                      <p:cBhvr additive="base">
+                                        <p:cTn id="55" dur="200"/>
+                                        <p:tgtEl>
+                                          <p:spTgt spid="23"/>
+                                        </p:tgtEl>
+                                        <p:attrNameLst>
+                                          <p:attrName>ppt_x</p:attrName>
+                                        </p:attrNameLst>
+                                      </p:cBhvr>
+                                      <p:tavLst>
+                                        <p:tav tm="0">
+                                          <p:val>
+                                            <p:strVal val="#ppt_x"/>
+                                          </p:val>
+                                        </p:tav>
+                                        <p:tav tm="100000">
+                                          <p:val>
+                                            <p:strVal val="#ppt_x+#ppt_w*1.125000"/>
+                                          </p:val>
+                                        </p:tav>
+                                      </p:tavLst>
+                                    </p:anim>
+                                    <p:animEffect transition="out" filter="wipe(right)">
+                                      <p:cBhvr>
+                                        <p:cTn id="56" dur="200"/>
+                                        <p:tgtEl>
+                                          <p:spTgt spid="23"/>
+                                        </p:tgtEl>
+                                      </p:cBhvr>
+                                    </p:animEffect>
+                                    <p:set>
+                                      <p:cBhvr>
+                                        <p:cTn id="57" dur="1" fill="hold">
+                                          <p:stCondLst>
+                                            <p:cond delay="199"/>
+                                          </p:stCondLst>
+                                        </p:cTn>
+                                        <p:tgtEl>
+                                          <p:spTgt spid="23"/>
+                                        </p:tgtEl>
+                                        <p:attrNameLst>
+                                          <p:attrName>style.visibility</p:attrName>
+                                        </p:attrNameLst>
+                                      </p:cBhvr>
+                                      <p:to>
+                                        <p:strVal val="hidden"/>
+                                      </p:to>
+                                    </p:set>
+                                  </p:childTnLst>
+                                </p:cTn>
+                              </p:par>
+                            </p:childTnLst>
+                          </p:cTn>
+                        </p:par>
+                        <p:par>
+                          <p:cTn id="58" fill="hold">
+                            <p:stCondLst>
+                              <p:cond delay="2500"/>
+                            </p:stCondLst>
+                            <p:childTnLst>
+                              <p:par>
+                                <p:cTn id="59" presetID="12" presetClass="exit" presetSubtype="2" fill="hold" grpId="0" nodeType="afterEffect">
+                                  <p:stCondLst>
+                                    <p:cond delay="0"/>
+                                  </p:stCondLst>
+                                  <p:childTnLst>
+                                    <p:anim calcmode="lin" valueType="num">
+                                      <p:cBhvr additive="base">
+                                        <p:cTn id="60" dur="200"/>
+                                        <p:tgtEl>
+                                          <p:spTgt spid="24"/>
+                                        </p:tgtEl>
+                                        <p:attrNameLst>
+                                          <p:attrName>ppt_x</p:attrName>
+                                        </p:attrNameLst>
+                                      </p:cBhvr>
+                                      <p:tavLst>
+                                        <p:tav tm="0">
+                                          <p:val>
+                                            <p:strVal val="#ppt_x"/>
+                                          </p:val>
+                                        </p:tav>
+                                        <p:tav tm="100000">
+                                          <p:val>
+                                            <p:strVal val="#ppt_x+#ppt_w*1.125000"/>
+                                          </p:val>
+                                        </p:tav>
+                                      </p:tavLst>
+                                    </p:anim>
+                                    <p:animEffect transition="out" filter="wipe(right)">
+                                      <p:cBhvr>
+                                        <p:cTn id="61" dur="200"/>
+                                        <p:tgtEl>
+                                          <p:spTgt spid="24"/>
+                                        </p:tgtEl>
+                                      </p:cBhvr>
+                                    </p:animEffect>
+                                    <p:set>
+                                      <p:cBhvr>
+                                        <p:cTn id="62" dur="1" fill="hold">
+                                          <p:stCondLst>
+                                            <p:cond delay="199"/>
+                                          </p:stCondLst>
+                                        </p:cTn>
+                                        <p:tgtEl>
+                                          <p:spTgt spid="24"/>
+                                        </p:tgtEl>
+                                        <p:attrNameLst>
+                                          <p:attrName>style.visibility</p:attrName>
+                                        </p:attrNameLst>
+                                      </p:cBhvr>
+                                      <p:to>
+                                        <p:strVal val="hidden"/>
+                                      </p:to>
+                                    </p:set>
+                                  </p:childTnLst>
+                                </p:cTn>
+                              </p:par>
+                            </p:childTnLst>
+                          </p:cTn>
+                        </p:par>
+                        <p:par>
+                          <p:cTn id="63" fill="hold">
+                            <p:stCondLst>
+                              <p:cond delay="2700"/>
+                            </p:stCondLst>
+                            <p:childTnLst>
+                              <p:par>
+                                <p:cTn id="64" presetID="12" presetClass="exit" presetSubtype="2" fill="hold" grpId="0" nodeType="afterEffect">
+                                  <p:stCondLst>
+                                    <p:cond delay="0"/>
+                                  </p:stCondLst>
+                                  <p:childTnLst>
+                                    <p:anim calcmode="lin" valueType="num">
+                                      <p:cBhvr additive="base">
+                                        <p:cTn id="65" dur="200"/>
+                                        <p:tgtEl>
+                                          <p:spTgt spid="25"/>
+                                        </p:tgtEl>
+                                        <p:attrNameLst>
+                                          <p:attrName>ppt_x</p:attrName>
+                                        </p:attrNameLst>
+                                      </p:cBhvr>
+                                      <p:tavLst>
+                                        <p:tav tm="0">
+                                          <p:val>
+                                            <p:strVal val="#ppt_x"/>
+                                          </p:val>
+                                        </p:tav>
+                                        <p:tav tm="100000">
+                                          <p:val>
+                                            <p:strVal val="#ppt_x+#ppt_w*1.125000"/>
+                                          </p:val>
+                                        </p:tav>
+                                      </p:tavLst>
+                                    </p:anim>
+                                    <p:animEffect transition="out" filter="wipe(right)">
+                                      <p:cBhvr>
+                                        <p:cTn id="66" dur="200"/>
+                                        <p:tgtEl>
+                                          <p:spTgt spid="25"/>
+                                        </p:tgtEl>
+                                      </p:cBhvr>
+                                    </p:animEffect>
+                                    <p:set>
+                                      <p:cBhvr>
+                                        <p:cTn id="67" dur="1" fill="hold">
+                                          <p:stCondLst>
+                                            <p:cond delay="199"/>
+                                          </p:stCondLst>
+                                        </p:cTn>
+                                        <p:tgtEl>
+                                          <p:spTgt spid="25"/>
+                                        </p:tgtEl>
+                                        <p:attrNameLst>
+                                          <p:attrName>style.visibility</p:attrName>
+                                        </p:attrNameLst>
+                                      </p:cBhvr>
+                                      <p:to>
+                                        <p:strVal val="hidden"/>
+                                      </p:to>
+                                    </p:set>
+                                  </p:childTnLst>
+                                </p:cTn>
+                              </p:par>
+                            </p:childTnLst>
+                          </p:cTn>
+                        </p:par>
+                        <p:par>
+                          <p:cTn id="68" fill="hold">
+                            <p:stCondLst>
+                              <p:cond delay="2900"/>
+                            </p:stCondLst>
+                            <p:childTnLst>
+                              <p:par>
+                                <p:cTn id="69" presetID="12" presetClass="exit" presetSubtype="2" fill="hold" grpId="0" nodeType="afterEffect">
+                                  <p:stCondLst>
+                                    <p:cond delay="0"/>
+                                  </p:stCondLst>
+                                  <p:childTnLst>
+                                    <p:anim calcmode="lin" valueType="num">
+                                      <p:cBhvr additive="base">
+                                        <p:cTn id="70" dur="200"/>
+                                        <p:tgtEl>
+                                          <p:spTgt spid="26"/>
+                                        </p:tgtEl>
+                                        <p:attrNameLst>
+                                          <p:attrName>ppt_x</p:attrName>
+                                        </p:attrNameLst>
+                                      </p:cBhvr>
+                                      <p:tavLst>
+                                        <p:tav tm="0">
+                                          <p:val>
+                                            <p:strVal val="#ppt_x"/>
+                                          </p:val>
+                                        </p:tav>
+                                        <p:tav tm="100000">
+                                          <p:val>
+                                            <p:strVal val="#ppt_x+#ppt_w*1.125000"/>
+                                          </p:val>
+                                        </p:tav>
+                                      </p:tavLst>
+                                    </p:anim>
+                                    <p:animEffect transition="out" filter="wipe(right)">
+                                      <p:cBhvr>
+                                        <p:cTn id="71" dur="200"/>
+                                        <p:tgtEl>
+                                          <p:spTgt spid="26"/>
+                                        </p:tgtEl>
+                                      </p:cBhvr>
+                                    </p:animEffect>
+                                    <p:set>
+                                      <p:cBhvr>
+                                        <p:cTn id="72" dur="1" fill="hold">
+                                          <p:stCondLst>
+                                            <p:cond delay="199"/>
+                                          </p:stCondLst>
+                                        </p:cTn>
+                                        <p:tgtEl>
+                                          <p:spTgt spid="26"/>
+                                        </p:tgtEl>
+                                        <p:attrNameLst>
+                                          <p:attrName>style.visibility</p:attrName>
+                                        </p:attrNameLst>
+                                      </p:cBhvr>
+                                      <p:to>
+                                        <p:strVal val="hidden"/>
+                                      </p:to>
+                                    </p:set>
+                                  </p:childTnLst>
+                                </p:cTn>
+                              </p:par>
+                            </p:childTnLst>
+                          </p:cTn>
+                        </p:par>
+                        <p:par>
+                          <p:cTn id="73" fill="hold">
+                            <p:stCondLst>
+                              <p:cond delay="3100"/>
+                            </p:stCondLst>
+                            <p:childTnLst>
+                              <p:par>
+                                <p:cTn id="74" presetID="12" presetClass="exit" presetSubtype="2" fill="hold" grpId="0" nodeType="afterEffect">
+                                  <p:stCondLst>
+                                    <p:cond delay="0"/>
+                                  </p:stCondLst>
+                                  <p:childTnLst>
+                                    <p:anim calcmode="lin" valueType="num">
+                                      <p:cBhvr additive="base">
+                                        <p:cTn id="75" dur="200"/>
+                                        <p:tgtEl>
+                                          <p:spTgt spid="27"/>
+                                        </p:tgtEl>
+                                        <p:attrNameLst>
+                                          <p:attrName>ppt_x</p:attrName>
+                                        </p:attrNameLst>
+                                      </p:cBhvr>
+                                      <p:tavLst>
+                                        <p:tav tm="0">
+                                          <p:val>
+                                            <p:strVal val="#ppt_x"/>
+                                          </p:val>
+                                        </p:tav>
+                                        <p:tav tm="100000">
+                                          <p:val>
+                                            <p:strVal val="#ppt_x+#ppt_w*1.125000"/>
+                                          </p:val>
+                                        </p:tav>
+                                      </p:tavLst>
+                                    </p:anim>
+                                    <p:animEffect transition="out" filter="wipe(right)">
+                                      <p:cBhvr>
+                                        <p:cTn id="76" dur="200"/>
+                                        <p:tgtEl>
+                                          <p:spTgt spid="27"/>
+                                        </p:tgtEl>
+                                      </p:cBhvr>
+                                    </p:animEffect>
+                                    <p:set>
+                                      <p:cBhvr>
+                                        <p:cTn id="77" dur="1" fill="hold">
+                                          <p:stCondLst>
+                                            <p:cond delay="199"/>
+                                          </p:stCondLst>
+                                        </p:cTn>
+                                        <p:tgtEl>
+                                          <p:spTgt spid="27"/>
+                                        </p:tgtEl>
+                                        <p:attrNameLst>
+                                          <p:attrName>style.visibility</p:attrName>
+                                        </p:attrNameLst>
+                                      </p:cBhvr>
+                                      <p:to>
+                                        <p:strVal val="hidden"/>
+                                      </p:to>
+                                    </p:set>
+                                  </p:childTnLst>
+                                </p:cTn>
+                              </p:par>
+                            </p:childTnLst>
+                          </p:cTn>
+                        </p:par>
+                        <p:par>
+                          <p:cTn id="78" fill="hold">
+                            <p:stCondLst>
+                              <p:cond delay="3300"/>
+                            </p:stCondLst>
+                            <p:childTnLst>
+                              <p:par>
+                                <p:cTn id="79" presetID="12" presetClass="exit" presetSubtype="2" fill="hold" grpId="0" nodeType="afterEffect">
+                                  <p:stCondLst>
+                                    <p:cond delay="0"/>
+                                  </p:stCondLst>
+                                  <p:childTnLst>
+                                    <p:anim calcmode="lin" valueType="num">
+                                      <p:cBhvr additive="base">
+                                        <p:cTn id="80" dur="200"/>
+                                        <p:tgtEl>
+                                          <p:spTgt spid="28"/>
+                                        </p:tgtEl>
+                                        <p:attrNameLst>
+                                          <p:attrName>ppt_x</p:attrName>
+                                        </p:attrNameLst>
+                                      </p:cBhvr>
+                                      <p:tavLst>
+                                        <p:tav tm="0">
+                                          <p:val>
+                                            <p:strVal val="#ppt_x"/>
+                                          </p:val>
+                                        </p:tav>
+                                        <p:tav tm="100000">
+                                          <p:val>
+                                            <p:strVal val="#ppt_x+#ppt_w*1.125000"/>
+                                          </p:val>
+                                        </p:tav>
+                                      </p:tavLst>
+                                    </p:anim>
+                                    <p:animEffect transition="out" filter="wipe(right)">
+                                      <p:cBhvr>
+                                        <p:cTn id="81" dur="200"/>
+                                        <p:tgtEl>
+                                          <p:spTgt spid="28"/>
+                                        </p:tgtEl>
+                                      </p:cBhvr>
+                                    </p:animEffect>
+                                    <p:set>
+                                      <p:cBhvr>
+                                        <p:cTn id="82" dur="1" fill="hold">
+                                          <p:stCondLst>
+                                            <p:cond delay="199"/>
+                                          </p:stCondLst>
+                                        </p:cTn>
+                                        <p:tgtEl>
+                                          <p:spTgt spid="28"/>
+                                        </p:tgtEl>
+                                        <p:attrNameLst>
+                                          <p:attrName>style.visibility</p:attrName>
+                                        </p:attrNameLst>
+                                      </p:cBhvr>
+                                      <p:to>
+                                        <p:strVal val="hidden"/>
+                                      </p:to>
+                                    </p:set>
+                                  </p:childTnLst>
+                                </p:cTn>
+                              </p:par>
+                            </p:childTnLst>
+                          </p:cTn>
+                        </p:par>
+                      </p:childTnLst>
+                    </p:cTn>
+                  </p:par>
+                </p:childTnLst>
+              </p:cTn>
+              <p:prevCondLst>
+                <p:cond evt="onPrev" delay="0">
+                  <p:tgtEl>
+                    <p:sldTgt/>
+                  </p:tgtEl>
+                </p:cond>
+              </p:prevCondLst>
+              <p:nextCondLst>
+                <p:cond evt="onNext" delay="0">
+                  <p:tgtEl>
+                    <p:sldTgt/>
+                  </p:tgtEl>
+                </p:cond>
+              </p:nextCondLst>
+            </p:seq>
+          </p:childTnLst>
+        </p:cTn>
+      </p:par>
+    </p:tnLst>
+    <p:bldLst>
+      <p:bldP spid="13" grpId="0" animBg="1"/>
+      <p:bldP spid="14" grpId="0" animBg="1"/>
+      <p:bldP spid="15" grpId="0" animBg="1"/>
+      <p:bldP spid="16" grpId="0" animBg="1"/>
+      <p:bldP spid="17" grpId="0" animBg="1"/>
+      <p:bldP spid="19" grpId="0" animBg="1"/>
+      <p:bldP spid="20" grpId="0" animBg="1"/>
+      <p:bldP spid="21" grpId="0" animBg="1"/>
+      <p:bldP spid="22" grpId="0" animBg="1"/>
+      <p:bldP spid="23" grpId="0" animBg="1"/>
+      <p:bldP spid="24" grpId="0" animBg="1"/>
+      <p:bldP spid="25" grpId="0" animBg="1"/>
+      <p:bldP spid="26" grpId="0" animBg="1"/>
+      <p:bldP spid="27" grpId="0" animBg="1"/>
+      <p:bldP spid="28" grpId="0" animBg="1"/>
+    </p:bldLst>
+  </p:timing>
+</p:sld>
+</file>
+
+<file path=ppt/slides/slide39.xml><?xml version="1.0" encoding="utf-8"?>
+<p:sld xmlns:a="http://schemas.openxmlformats.org/drawingml/2006/main" xmlns:r="http://schemas.openxmlformats.org/officeDocument/2006/relationships" xmlns:p="http://schemas.openxmlformats.org/presentationml/2006/main" show="0">
+  <p:cSld>
+    <p:spTree>
+      <p:nvGrpSpPr>
+        <p:cNvPr id="1" name=""/>
+        <p:cNvGrpSpPr/>
+        <p:nvPr/>
+      </p:nvGrpSpPr>
+      <p:grpSpPr>
+        <a:xfrm>
+          <a:off x="0" y="0"/>
+          <a:ext cx="0" cy="0"/>
+          <a:chOff x="0" y="0"/>
+          <a:chExt cx="0" cy="0"/>
+        </a:xfrm>
+      </p:grpSpPr>
+      <p:sp>
+        <p:nvSpPr>
+          <p:cNvPr id="2" name="Title 1">
+            <a:extLst>
+              <a:ext uri="{FF2B5EF4-FFF2-40B4-BE49-F238E27FC236}">
+                <a16:creationId xmlns:a16="http://schemas.microsoft.com/office/drawing/2014/main" id="{4812F7AB-297E-6F4C-0614-0CAAC7590774}"/>
+              </a:ext>
+            </a:extLst>
+          </p:cNvPr>
+          <p:cNvSpPr>
+            <a:spLocks noGrp="1"/>
+          </p:cNvSpPr>
+          <p:nvPr>
+            <p:ph type="title"/>
+          </p:nvPr>
+        </p:nvSpPr>
+        <p:spPr>
+          <a:xfrm>
+            <a:off x="1666847" y="5413684"/>
+            <a:ext cx="9208625" cy="1325563"/>
+          </a:xfrm>
+        </p:spPr>
+        <p:txBody>
+          <a:bodyPr>
+            <a:noAutofit/>
+          </a:bodyPr>
+          <a:lstStyle/>
+          <a:p>
+            <a:pPr algn="ctr"/>
+            <a:r>
+              <a:rPr lang="tr-TR" sz="3200" dirty="0" err="1">
+                <a:solidFill>
+                  <a:schemeClr val="accent1"/>
+                </a:solidFill>
+                <a:latin typeface="Century Gothic" panose="020B0502020202020204" pitchFamily="34" charset="0"/>
+              </a:rPr>
+              <a:t>Another</a:t>
+            </a:r>
+            <a:r>
+              <a:rPr lang="tr-TR" sz="3200" dirty="0">
+                <a:solidFill>
+                  <a:schemeClr val="accent1"/>
+                </a:solidFill>
+                <a:latin typeface="Century Gothic" panose="020B0502020202020204" pitchFamily="34" charset="0"/>
+              </a:rPr>
+              <a:t> JSON </a:t>
+            </a:r>
+            <a:r>
+              <a:rPr lang="tr-TR" sz="3200" dirty="0" err="1">
+                <a:solidFill>
+                  <a:schemeClr val="accent1"/>
+                </a:solidFill>
+                <a:latin typeface="Century Gothic" panose="020B0502020202020204" pitchFamily="34" charset="0"/>
+              </a:rPr>
+              <a:t>Example</a:t>
+            </a:r>
+            <a:r>
+              <a:rPr lang="tr-TR" sz="3200" dirty="0">
+                <a:solidFill>
+                  <a:schemeClr val="accent1"/>
+                </a:solidFill>
+                <a:latin typeface="Century Gothic" panose="020B0502020202020204" pitchFamily="34" charset="0"/>
+              </a:rPr>
+              <a:t>: </a:t>
+            </a:r>
+            <a:r>
+              <a:rPr lang="tr-TR" sz="3200" dirty="0" err="1">
+                <a:solidFill>
+                  <a:schemeClr val="accent1"/>
+                </a:solidFill>
+                <a:latin typeface="Century Gothic" panose="020B0502020202020204" pitchFamily="34" charset="0"/>
+              </a:rPr>
+              <a:t>Thing</a:t>
+            </a:r>
+            <a:r>
+              <a:rPr lang="tr-TR" sz="3200" dirty="0">
+                <a:solidFill>
+                  <a:schemeClr val="accent1"/>
+                </a:solidFill>
+                <a:latin typeface="Century Gothic" panose="020B0502020202020204" pitchFamily="34" charset="0"/>
+              </a:rPr>
+              <a:t> </a:t>
+            </a:r>
+            <a:r>
+              <a:rPr lang="tr-TR" sz="3200" dirty="0" err="1">
+                <a:solidFill>
+                  <a:schemeClr val="accent1"/>
+                </a:solidFill>
+                <a:latin typeface="Century Gothic" panose="020B0502020202020204" pitchFamily="34" charset="0"/>
+              </a:rPr>
+              <a:t>Description</a:t>
+            </a:r>
+            <a:endParaRPr lang="en-US" sz="3200" dirty="0">
+              <a:solidFill>
+                <a:schemeClr val="accent1"/>
+              </a:solidFill>
+              <a:latin typeface="Century Gothic" panose="020B0502020202020204" pitchFamily="34" charset="0"/>
+            </a:endParaRPr>
+          </a:p>
+        </p:txBody>
+      </p:sp>
+      <p:sp>
+        <p:nvSpPr>
           <p:cNvPr id="3" name="Content Placeholder 2">
             <a:extLst>
               <a:ext uri="{FF2B5EF4-FFF2-40B4-BE49-F238E27FC236}">
@@ -31428,7 +33646,7 @@
     </p:spTree>
     <p:extLst>
       <p:ext uri="{BB962C8B-B14F-4D97-AF65-F5344CB8AC3E}">
-        <p14:creationId xmlns:p14="http://schemas.microsoft.com/office/powerpoint/2010/main" val="2331376849"/>
+        <p14:creationId xmlns:p14="http://schemas.microsoft.com/office/powerpoint/2010/main" val="47000994"/>
       </p:ext>
     </p:extLst>
   </p:cSld>
@@ -31531,376 +33749,6 @@
       <p:bldP spid="3" grpId="0"/>
     </p:bldLst>
   </p:timing>
-</p:sld>
-</file>
-
-<file path=ppt/slides/slide39.xml><?xml version="1.0" encoding="utf-8"?>
-<p:sld xmlns:a="http://schemas.openxmlformats.org/drawingml/2006/main" xmlns:r="http://schemas.openxmlformats.org/officeDocument/2006/relationships" xmlns:p="http://schemas.openxmlformats.org/presentationml/2006/main">
-  <p:cSld>
-    <p:spTree>
-      <p:nvGrpSpPr>
-        <p:cNvPr id="1" name=""/>
-        <p:cNvGrpSpPr/>
-        <p:nvPr/>
-      </p:nvGrpSpPr>
-      <p:grpSpPr>
-        <a:xfrm>
-          <a:off x="0" y="0"/>
-          <a:ext cx="0" cy="0"/>
-          <a:chOff x="0" y="0"/>
-          <a:chExt cx="0" cy="0"/>
-        </a:xfrm>
-      </p:grpSpPr>
-      <p:sp>
-        <p:nvSpPr>
-          <p:cNvPr id="6" name="Rounded Rectangle 5">
-            <a:extLst>
-              <a:ext uri="{FF2B5EF4-FFF2-40B4-BE49-F238E27FC236}">
-                <a16:creationId xmlns:a16="http://schemas.microsoft.com/office/drawing/2014/main" id="{079D50C5-FAF9-69C9-E581-B5318807CD15}"/>
-              </a:ext>
-            </a:extLst>
-          </p:cNvPr>
-          <p:cNvSpPr/>
-          <p:nvPr/>
-        </p:nvSpPr>
-        <p:spPr>
-          <a:xfrm>
-            <a:off x="1032256" y="3291829"/>
-            <a:ext cx="4547616" cy="2818177"/>
-          </a:xfrm>
-          <a:prstGeom prst="roundRect">
-            <a:avLst>
-              <a:gd name="adj" fmla="val 8522"/>
-            </a:avLst>
-          </a:prstGeom>
-          <a:noFill/>
-          <a:ln w="57150">
-            <a:solidFill>
-              <a:schemeClr val="accent2"/>
-            </a:solidFill>
-          </a:ln>
-        </p:spPr>
-        <p:style>
-          <a:lnRef idx="2">
-            <a:schemeClr val="accent1">
-              <a:shade val="15000"/>
-            </a:schemeClr>
-          </a:lnRef>
-          <a:fillRef idx="1">
-            <a:schemeClr val="accent1"/>
-          </a:fillRef>
-          <a:effectRef idx="0">
-            <a:schemeClr val="accent1"/>
-          </a:effectRef>
-          <a:fontRef idx="minor">
-            <a:schemeClr val="lt1"/>
-          </a:fontRef>
-        </p:style>
-        <p:txBody>
-          <a:bodyPr rtlCol="0" anchor="ctr"/>
-          <a:lstStyle/>
-          <a:p>
-            <a:pPr algn="ctr"/>
-            <a:endParaRPr lang="en-US"/>
-          </a:p>
-        </p:txBody>
-      </p:sp>
-      <p:sp>
-        <p:nvSpPr>
-          <p:cNvPr id="8" name="TextBox 7">
-            <a:extLst>
-              <a:ext uri="{FF2B5EF4-FFF2-40B4-BE49-F238E27FC236}">
-                <a16:creationId xmlns:a16="http://schemas.microsoft.com/office/drawing/2014/main" id="{17B2EE81-90D0-AEF5-195E-CD3BBEC1AAC8}"/>
-              </a:ext>
-            </a:extLst>
-          </p:cNvPr>
-          <p:cNvSpPr txBox="1"/>
-          <p:nvPr/>
-        </p:nvSpPr>
-        <p:spPr>
-          <a:xfrm>
-            <a:off x="2731008" y="585216"/>
-            <a:ext cx="184731" cy="369332"/>
-          </a:xfrm>
-          <a:prstGeom prst="rect">
-            <a:avLst/>
-          </a:prstGeom>
-          <a:noFill/>
-        </p:spPr>
-        <p:txBody>
-          <a:bodyPr wrap="none" rtlCol="0">
-            <a:spAutoFit/>
-          </a:bodyPr>
-          <a:lstStyle/>
-          <a:p>
-            <a:endParaRPr lang="en-US" dirty="0"/>
-          </a:p>
-        </p:txBody>
-      </p:sp>
-      <p:sp>
-        <p:nvSpPr>
-          <p:cNvPr id="13" name="TextBox 12">
-            <a:extLst>
-              <a:ext uri="{FF2B5EF4-FFF2-40B4-BE49-F238E27FC236}">
-                <a16:creationId xmlns:a16="http://schemas.microsoft.com/office/drawing/2014/main" id="{194EC36A-72C0-5D97-08B6-18C18A96A95D}"/>
-              </a:ext>
-            </a:extLst>
-          </p:cNvPr>
-          <p:cNvSpPr txBox="1"/>
-          <p:nvPr/>
-        </p:nvSpPr>
-        <p:spPr>
-          <a:xfrm>
-            <a:off x="8769346" y="2544227"/>
-            <a:ext cx="2390398" cy="584775"/>
-          </a:xfrm>
-          <a:prstGeom prst="rect">
-            <a:avLst/>
-          </a:prstGeom>
-          <a:noFill/>
-        </p:spPr>
-        <p:txBody>
-          <a:bodyPr wrap="none" rtlCol="0">
-            <a:spAutoFit/>
-          </a:bodyPr>
-          <a:lstStyle/>
-          <a:p>
-            <a:r>
-              <a:rPr lang="en-US" sz="3200" dirty="0">
-                <a:solidFill>
-                  <a:schemeClr val="accent2"/>
-                </a:solidFill>
-                <a:latin typeface="Century Gothic" panose="020B0502020202020204" pitchFamily="34" charset="0"/>
-              </a:rPr>
-              <a:t>Next Video</a:t>
-            </a:r>
-          </a:p>
-        </p:txBody>
-      </p:sp>
-      <p:sp>
-        <p:nvSpPr>
-          <p:cNvPr id="14" name="Rectangle 13">
-            <a:extLst>
-              <a:ext uri="{FF2B5EF4-FFF2-40B4-BE49-F238E27FC236}">
-                <a16:creationId xmlns:a16="http://schemas.microsoft.com/office/drawing/2014/main" id="{30610344-5073-9351-D254-6D8408C00B10}"/>
-              </a:ext>
-            </a:extLst>
-          </p:cNvPr>
-          <p:cNvSpPr>
-            <a:spLocks/>
-          </p:cNvSpPr>
-          <p:nvPr/>
-        </p:nvSpPr>
-        <p:spPr>
-          <a:xfrm>
-            <a:off x="4507675" y="432606"/>
-            <a:ext cx="3176651" cy="3696485"/>
-          </a:xfrm>
-          <a:prstGeom prst="rect">
-            <a:avLst/>
-          </a:prstGeom>
-          <a:noFill/>
-        </p:spPr>
-        <p:txBody>
-          <a:bodyPr wrap="none" lIns="91440" tIns="45720" rIns="91440" bIns="45720">
-            <a:prstTxWarp prst="textArchUp">
-              <a:avLst>
-                <a:gd name="adj" fmla="val 11740300"/>
-              </a:avLst>
-            </a:prstTxWarp>
-            <a:spAutoFit/>
-          </a:bodyPr>
-          <a:lstStyle/>
-          <a:p>
-            <a:r>
-              <a:rPr lang="en-US" sz="3600" dirty="0">
-                <a:solidFill>
-                  <a:schemeClr val="accent1"/>
-                </a:solidFill>
-                <a:latin typeface="Century Gothic" panose="020B0502020202020204" pitchFamily="34" charset="0"/>
-              </a:rPr>
-              <a:t>Subscribe to our Channel</a:t>
-            </a:r>
-          </a:p>
-        </p:txBody>
-      </p:sp>
-      <p:sp>
-        <p:nvSpPr>
-          <p:cNvPr id="2" name="TextBox 1">
-            <a:extLst>
-              <a:ext uri="{FF2B5EF4-FFF2-40B4-BE49-F238E27FC236}">
-                <a16:creationId xmlns:a16="http://schemas.microsoft.com/office/drawing/2014/main" id="{DB648E07-0ADA-3213-F04B-B618F86FE55A}"/>
-              </a:ext>
-            </a:extLst>
-          </p:cNvPr>
-          <p:cNvSpPr txBox="1"/>
-          <p:nvPr/>
-        </p:nvSpPr>
-        <p:spPr>
-          <a:xfrm>
-            <a:off x="1032256" y="2544228"/>
-            <a:ext cx="1556836" cy="584775"/>
-          </a:xfrm>
-          <a:prstGeom prst="rect">
-            <a:avLst/>
-          </a:prstGeom>
-          <a:noFill/>
-        </p:spPr>
-        <p:txBody>
-          <a:bodyPr wrap="none" rtlCol="0">
-            <a:spAutoFit/>
-          </a:bodyPr>
-          <a:lstStyle/>
-          <a:p>
-            <a:r>
-              <a:rPr lang="en-US" sz="3200" dirty="0">
-                <a:solidFill>
-                  <a:schemeClr val="accent2"/>
-                </a:solidFill>
-                <a:latin typeface="Century Gothic" panose="020B0502020202020204" pitchFamily="34" charset="0"/>
-              </a:rPr>
-              <a:t>Playlist</a:t>
-            </a:r>
-            <a:r>
-              <a:rPr lang="en-US" sz="2400" dirty="0">
-                <a:solidFill>
-                  <a:schemeClr val="accent2"/>
-                </a:solidFill>
-                <a:latin typeface="Century Gothic" panose="020B0502020202020204" pitchFamily="34" charset="0"/>
-              </a:rPr>
-              <a:t> </a:t>
-            </a:r>
-          </a:p>
-        </p:txBody>
-      </p:sp>
-      <p:sp>
-        <p:nvSpPr>
-          <p:cNvPr id="4" name="Oval 3">
-            <a:extLst>
-              <a:ext uri="{FF2B5EF4-FFF2-40B4-BE49-F238E27FC236}">
-                <a16:creationId xmlns:a16="http://schemas.microsoft.com/office/drawing/2014/main" id="{B0419334-D010-AABC-F69E-4CE3A439194D}"/>
-              </a:ext>
-            </a:extLst>
-          </p:cNvPr>
-          <p:cNvSpPr/>
-          <p:nvPr/>
-        </p:nvSpPr>
-        <p:spPr>
-          <a:xfrm>
-            <a:off x="4899713" y="736429"/>
-            <a:ext cx="2392574" cy="2392574"/>
-          </a:xfrm>
-          <a:prstGeom prst="ellipse">
-            <a:avLst/>
-          </a:prstGeom>
-          <a:noFill/>
-          <a:ln w="57150">
-            <a:solidFill>
-              <a:schemeClr val="accent1"/>
-            </a:solidFill>
-          </a:ln>
-        </p:spPr>
-        <p:style>
-          <a:lnRef idx="2">
-            <a:schemeClr val="accent1">
-              <a:shade val="15000"/>
-            </a:schemeClr>
-          </a:lnRef>
-          <a:fillRef idx="1">
-            <a:schemeClr val="accent1"/>
-          </a:fillRef>
-          <a:effectRef idx="0">
-            <a:schemeClr val="accent1"/>
-          </a:effectRef>
-          <a:fontRef idx="minor">
-            <a:schemeClr val="lt1"/>
-          </a:fontRef>
-        </p:style>
-        <p:txBody>
-          <a:bodyPr rtlCol="0" anchor="ctr"/>
-          <a:lstStyle/>
-          <a:p>
-            <a:pPr algn="ctr"/>
-            <a:endParaRPr lang="en-US"/>
-          </a:p>
-        </p:txBody>
-      </p:sp>
-      <p:sp>
-        <p:nvSpPr>
-          <p:cNvPr id="7" name="Rounded Rectangle 6">
-            <a:extLst>
-              <a:ext uri="{FF2B5EF4-FFF2-40B4-BE49-F238E27FC236}">
-                <a16:creationId xmlns:a16="http://schemas.microsoft.com/office/drawing/2014/main" id="{17CFD8EC-DAD6-2D70-BC4C-CA8D499F942E}"/>
-              </a:ext>
-            </a:extLst>
-          </p:cNvPr>
-          <p:cNvSpPr/>
-          <p:nvPr/>
-        </p:nvSpPr>
-        <p:spPr>
-          <a:xfrm>
-            <a:off x="6612128" y="3291829"/>
-            <a:ext cx="4547616" cy="2818177"/>
-          </a:xfrm>
-          <a:prstGeom prst="roundRect">
-            <a:avLst>
-              <a:gd name="adj" fmla="val 8522"/>
-            </a:avLst>
-          </a:prstGeom>
-          <a:noFill/>
-          <a:ln w="57150">
-            <a:solidFill>
-              <a:schemeClr val="accent2"/>
-            </a:solidFill>
-          </a:ln>
-        </p:spPr>
-        <p:style>
-          <a:lnRef idx="2">
-            <a:schemeClr val="accent1">
-              <a:shade val="15000"/>
-            </a:schemeClr>
-          </a:lnRef>
-          <a:fillRef idx="1">
-            <a:schemeClr val="accent1"/>
-          </a:fillRef>
-          <a:effectRef idx="0">
-            <a:schemeClr val="accent1"/>
-          </a:effectRef>
-          <a:fontRef idx="minor">
-            <a:schemeClr val="lt1"/>
-          </a:fontRef>
-        </p:style>
-        <p:txBody>
-          <a:bodyPr rtlCol="0" anchor="ctr"/>
-          <a:lstStyle/>
-          <a:p>
-            <a:pPr algn="ctr"/>
-            <a:endParaRPr lang="en-US"/>
-          </a:p>
-        </p:txBody>
-      </p:sp>
-    </p:spTree>
-    <p:extLst>
-      <p:ext uri="{BB962C8B-B14F-4D97-AF65-F5344CB8AC3E}">
-        <p14:creationId xmlns:p14="http://schemas.microsoft.com/office/powerpoint/2010/main" val="891335981"/>
-      </p:ext>
-    </p:extLst>
-  </p:cSld>
-  <p:clrMapOvr>
-    <a:masterClrMapping/>
-  </p:clrMapOvr>
-  <mc:AlternateContent xmlns:mc="http://schemas.openxmlformats.org/markup-compatibility/2006" xmlns:p159="http://schemas.microsoft.com/office/powerpoint/2015/09/main">
-    <mc:Choice Requires="p159">
-      <p:transition xmlns:p14="http://schemas.microsoft.com/office/powerpoint/2010/main" spd="slow" p14:dur="2000" advTm="10000">
-        <p159:morph option="byObject"/>
-      </p:transition>
-    </mc:Choice>
-    <mc:Fallback xmlns="">
-      <p:transition spd="slow" advTm="10000">
-        <p:fade/>
-      </p:transition>
-    </mc:Fallback>
-  </mc:AlternateContent>
 </p:sld>
 </file>
 
@@ -32105,13 +33953,13 @@
           <p:nvPr/>
         </p:nvPicPr>
         <p:blipFill>
-          <a:blip r:embed="rId3">
+          <a:blip r:embed="rId7">
             <a:extLst>
               <a:ext uri="{28A0092B-C50C-407E-A947-70E740481C1C}">
                 <a14:useLocalDpi xmlns:a14="http://schemas.microsoft.com/office/drawing/2010/main" val="0"/>
               </a:ext>
               <a:ext uri="{96DAC541-7B7A-43D3-8B79-37D633B846F1}">
-                <asvg:svgBlip xmlns:asvg="http://schemas.microsoft.com/office/drawing/2016/SVG/main" r:embed="rId7"/>
+                <asvg:svgBlip xmlns:asvg="http://schemas.microsoft.com/office/drawing/2016/SVG/main" r:embed="rId8"/>
               </a:ext>
             </a:extLst>
           </a:blip>
@@ -32236,13 +34084,13 @@
           <p:nvPr/>
         </p:nvPicPr>
         <p:blipFill>
-          <a:blip r:embed="rId8">
+          <a:blip r:embed="rId9">
             <a:extLst>
               <a:ext uri="{28A0092B-C50C-407E-A947-70E740481C1C}">
                 <a14:useLocalDpi xmlns:a14="http://schemas.microsoft.com/office/drawing/2010/main" val="0"/>
               </a:ext>
               <a:ext uri="{96DAC541-7B7A-43D3-8B79-37D633B846F1}">
-                <asvg:svgBlip xmlns:asvg="http://schemas.microsoft.com/office/drawing/2016/SVG/main" r:embed="rId9"/>
+                <asvg:svgBlip xmlns:asvg="http://schemas.microsoft.com/office/drawing/2016/SVG/main" r:embed="rId10"/>
               </a:ext>
             </a:extLst>
           </a:blip>
@@ -32274,13 +34122,13 @@
           <p:nvPr/>
         </p:nvPicPr>
         <p:blipFill>
-          <a:blip r:embed="rId10">
+          <a:blip r:embed="rId11">
             <a:extLst>
               <a:ext uri="{28A0092B-C50C-407E-A947-70E740481C1C}">
                 <a14:useLocalDpi xmlns:a14="http://schemas.microsoft.com/office/drawing/2010/main" val="0"/>
               </a:ext>
               <a:ext uri="{96DAC541-7B7A-43D3-8B79-37D633B846F1}">
-                <asvg:svgBlip xmlns:asvg="http://schemas.microsoft.com/office/drawing/2016/SVG/main" r:embed="rId11"/>
+                <asvg:svgBlip xmlns:asvg="http://schemas.microsoft.com/office/drawing/2016/SVG/main" r:embed="rId12"/>
               </a:ext>
             </a:extLst>
           </a:blip>
@@ -32404,13 +34252,13 @@
           <p:nvPr/>
         </p:nvPicPr>
         <p:blipFill>
-          <a:blip r:embed="rId12">
+          <a:blip r:embed="rId13">
             <a:extLst>
               <a:ext uri="{28A0092B-C50C-407E-A947-70E740481C1C}">
                 <a14:useLocalDpi xmlns:a14="http://schemas.microsoft.com/office/drawing/2010/main" val="0"/>
               </a:ext>
               <a:ext uri="{96DAC541-7B7A-43D3-8B79-37D633B846F1}">
-                <asvg:svgBlip xmlns:asvg="http://schemas.microsoft.com/office/drawing/2016/SVG/main" r:embed="rId13"/>
+                <asvg:svgBlip xmlns:asvg="http://schemas.microsoft.com/office/drawing/2016/SVG/main" r:embed="rId14"/>
               </a:ext>
             </a:extLst>
           </a:blip>
@@ -33537,6 +35385,376 @@
 </file>
 
 <file path=ppt/slides/slide40.xml><?xml version="1.0" encoding="utf-8"?>
+<p:sld xmlns:a="http://schemas.openxmlformats.org/drawingml/2006/main" xmlns:r="http://schemas.openxmlformats.org/officeDocument/2006/relationships" xmlns:p="http://schemas.openxmlformats.org/presentationml/2006/main">
+  <p:cSld>
+    <p:spTree>
+      <p:nvGrpSpPr>
+        <p:cNvPr id="1" name=""/>
+        <p:cNvGrpSpPr/>
+        <p:nvPr/>
+      </p:nvGrpSpPr>
+      <p:grpSpPr>
+        <a:xfrm>
+          <a:off x="0" y="0"/>
+          <a:ext cx="0" cy="0"/>
+          <a:chOff x="0" y="0"/>
+          <a:chExt cx="0" cy="0"/>
+        </a:xfrm>
+      </p:grpSpPr>
+      <p:sp>
+        <p:nvSpPr>
+          <p:cNvPr id="6" name="Rounded Rectangle 5">
+            <a:extLst>
+              <a:ext uri="{FF2B5EF4-FFF2-40B4-BE49-F238E27FC236}">
+                <a16:creationId xmlns:a16="http://schemas.microsoft.com/office/drawing/2014/main" id="{079D50C5-FAF9-69C9-E581-B5318807CD15}"/>
+              </a:ext>
+            </a:extLst>
+          </p:cNvPr>
+          <p:cNvSpPr/>
+          <p:nvPr/>
+        </p:nvSpPr>
+        <p:spPr>
+          <a:xfrm>
+            <a:off x="1032256" y="3291829"/>
+            <a:ext cx="4547616" cy="2818177"/>
+          </a:xfrm>
+          <a:prstGeom prst="roundRect">
+            <a:avLst>
+              <a:gd name="adj" fmla="val 8522"/>
+            </a:avLst>
+          </a:prstGeom>
+          <a:noFill/>
+          <a:ln w="57150">
+            <a:solidFill>
+              <a:schemeClr val="accent2"/>
+            </a:solidFill>
+          </a:ln>
+        </p:spPr>
+        <p:style>
+          <a:lnRef idx="2">
+            <a:schemeClr val="accent1">
+              <a:shade val="15000"/>
+            </a:schemeClr>
+          </a:lnRef>
+          <a:fillRef idx="1">
+            <a:schemeClr val="accent1"/>
+          </a:fillRef>
+          <a:effectRef idx="0">
+            <a:schemeClr val="accent1"/>
+          </a:effectRef>
+          <a:fontRef idx="minor">
+            <a:schemeClr val="lt1"/>
+          </a:fontRef>
+        </p:style>
+        <p:txBody>
+          <a:bodyPr rtlCol="0" anchor="ctr"/>
+          <a:lstStyle/>
+          <a:p>
+            <a:pPr algn="ctr"/>
+            <a:endParaRPr lang="en-US"/>
+          </a:p>
+        </p:txBody>
+      </p:sp>
+      <p:sp>
+        <p:nvSpPr>
+          <p:cNvPr id="8" name="TextBox 7">
+            <a:extLst>
+              <a:ext uri="{FF2B5EF4-FFF2-40B4-BE49-F238E27FC236}">
+                <a16:creationId xmlns:a16="http://schemas.microsoft.com/office/drawing/2014/main" id="{17B2EE81-90D0-AEF5-195E-CD3BBEC1AAC8}"/>
+              </a:ext>
+            </a:extLst>
+          </p:cNvPr>
+          <p:cNvSpPr txBox="1"/>
+          <p:nvPr/>
+        </p:nvSpPr>
+        <p:spPr>
+          <a:xfrm>
+            <a:off x="2731008" y="585216"/>
+            <a:ext cx="184731" cy="369332"/>
+          </a:xfrm>
+          <a:prstGeom prst="rect">
+            <a:avLst/>
+          </a:prstGeom>
+          <a:noFill/>
+        </p:spPr>
+        <p:txBody>
+          <a:bodyPr wrap="none" rtlCol="0">
+            <a:spAutoFit/>
+          </a:bodyPr>
+          <a:lstStyle/>
+          <a:p>
+            <a:endParaRPr lang="en-US" dirty="0"/>
+          </a:p>
+        </p:txBody>
+      </p:sp>
+      <p:sp>
+        <p:nvSpPr>
+          <p:cNvPr id="13" name="TextBox 12">
+            <a:extLst>
+              <a:ext uri="{FF2B5EF4-FFF2-40B4-BE49-F238E27FC236}">
+                <a16:creationId xmlns:a16="http://schemas.microsoft.com/office/drawing/2014/main" id="{194EC36A-72C0-5D97-08B6-18C18A96A95D}"/>
+              </a:ext>
+            </a:extLst>
+          </p:cNvPr>
+          <p:cNvSpPr txBox="1"/>
+          <p:nvPr/>
+        </p:nvSpPr>
+        <p:spPr>
+          <a:xfrm>
+            <a:off x="8769346" y="2544227"/>
+            <a:ext cx="2390398" cy="584775"/>
+          </a:xfrm>
+          <a:prstGeom prst="rect">
+            <a:avLst/>
+          </a:prstGeom>
+          <a:noFill/>
+        </p:spPr>
+        <p:txBody>
+          <a:bodyPr wrap="none" rtlCol="0">
+            <a:spAutoFit/>
+          </a:bodyPr>
+          <a:lstStyle/>
+          <a:p>
+            <a:r>
+              <a:rPr lang="en-US" sz="3200" dirty="0">
+                <a:solidFill>
+                  <a:schemeClr val="accent2"/>
+                </a:solidFill>
+                <a:latin typeface="Century Gothic" panose="020B0502020202020204" pitchFamily="34" charset="0"/>
+              </a:rPr>
+              <a:t>Next Video</a:t>
+            </a:r>
+          </a:p>
+        </p:txBody>
+      </p:sp>
+      <p:sp>
+        <p:nvSpPr>
+          <p:cNvPr id="14" name="Rectangle 13">
+            <a:extLst>
+              <a:ext uri="{FF2B5EF4-FFF2-40B4-BE49-F238E27FC236}">
+                <a16:creationId xmlns:a16="http://schemas.microsoft.com/office/drawing/2014/main" id="{30610344-5073-9351-D254-6D8408C00B10}"/>
+              </a:ext>
+            </a:extLst>
+          </p:cNvPr>
+          <p:cNvSpPr>
+            <a:spLocks/>
+          </p:cNvSpPr>
+          <p:nvPr/>
+        </p:nvSpPr>
+        <p:spPr>
+          <a:xfrm>
+            <a:off x="4507675" y="432606"/>
+            <a:ext cx="3176651" cy="3696485"/>
+          </a:xfrm>
+          <a:prstGeom prst="rect">
+            <a:avLst/>
+          </a:prstGeom>
+          <a:noFill/>
+        </p:spPr>
+        <p:txBody>
+          <a:bodyPr wrap="none" lIns="91440" tIns="45720" rIns="91440" bIns="45720">
+            <a:prstTxWarp prst="textArchUp">
+              <a:avLst>
+                <a:gd name="adj" fmla="val 11740300"/>
+              </a:avLst>
+            </a:prstTxWarp>
+            <a:spAutoFit/>
+          </a:bodyPr>
+          <a:lstStyle/>
+          <a:p>
+            <a:r>
+              <a:rPr lang="en-US" sz="3600" dirty="0">
+                <a:solidFill>
+                  <a:schemeClr val="accent1"/>
+                </a:solidFill>
+                <a:latin typeface="Century Gothic" panose="020B0502020202020204" pitchFamily="34" charset="0"/>
+              </a:rPr>
+              <a:t>Subscribe to our Channel</a:t>
+            </a:r>
+          </a:p>
+        </p:txBody>
+      </p:sp>
+      <p:sp>
+        <p:nvSpPr>
+          <p:cNvPr id="2" name="TextBox 1">
+            <a:extLst>
+              <a:ext uri="{FF2B5EF4-FFF2-40B4-BE49-F238E27FC236}">
+                <a16:creationId xmlns:a16="http://schemas.microsoft.com/office/drawing/2014/main" id="{DB648E07-0ADA-3213-F04B-B618F86FE55A}"/>
+              </a:ext>
+            </a:extLst>
+          </p:cNvPr>
+          <p:cNvSpPr txBox="1"/>
+          <p:nvPr/>
+        </p:nvSpPr>
+        <p:spPr>
+          <a:xfrm>
+            <a:off x="1032256" y="2544228"/>
+            <a:ext cx="1556836" cy="584775"/>
+          </a:xfrm>
+          <a:prstGeom prst="rect">
+            <a:avLst/>
+          </a:prstGeom>
+          <a:noFill/>
+        </p:spPr>
+        <p:txBody>
+          <a:bodyPr wrap="none" rtlCol="0">
+            <a:spAutoFit/>
+          </a:bodyPr>
+          <a:lstStyle/>
+          <a:p>
+            <a:r>
+              <a:rPr lang="en-US" sz="3200" dirty="0">
+                <a:solidFill>
+                  <a:schemeClr val="accent2"/>
+                </a:solidFill>
+                <a:latin typeface="Century Gothic" panose="020B0502020202020204" pitchFamily="34" charset="0"/>
+              </a:rPr>
+              <a:t>Playlist</a:t>
+            </a:r>
+            <a:r>
+              <a:rPr lang="en-US" sz="2400" dirty="0">
+                <a:solidFill>
+                  <a:schemeClr val="accent2"/>
+                </a:solidFill>
+                <a:latin typeface="Century Gothic" panose="020B0502020202020204" pitchFamily="34" charset="0"/>
+              </a:rPr>
+              <a:t> </a:t>
+            </a:r>
+          </a:p>
+        </p:txBody>
+      </p:sp>
+      <p:sp>
+        <p:nvSpPr>
+          <p:cNvPr id="4" name="Oval 3">
+            <a:extLst>
+              <a:ext uri="{FF2B5EF4-FFF2-40B4-BE49-F238E27FC236}">
+                <a16:creationId xmlns:a16="http://schemas.microsoft.com/office/drawing/2014/main" id="{B0419334-D010-AABC-F69E-4CE3A439194D}"/>
+              </a:ext>
+            </a:extLst>
+          </p:cNvPr>
+          <p:cNvSpPr/>
+          <p:nvPr/>
+        </p:nvSpPr>
+        <p:spPr>
+          <a:xfrm>
+            <a:off x="4899713" y="736429"/>
+            <a:ext cx="2392574" cy="2392574"/>
+          </a:xfrm>
+          <a:prstGeom prst="ellipse">
+            <a:avLst/>
+          </a:prstGeom>
+          <a:noFill/>
+          <a:ln w="57150">
+            <a:solidFill>
+              <a:schemeClr val="accent1"/>
+            </a:solidFill>
+          </a:ln>
+        </p:spPr>
+        <p:style>
+          <a:lnRef idx="2">
+            <a:schemeClr val="accent1">
+              <a:shade val="15000"/>
+            </a:schemeClr>
+          </a:lnRef>
+          <a:fillRef idx="1">
+            <a:schemeClr val="accent1"/>
+          </a:fillRef>
+          <a:effectRef idx="0">
+            <a:schemeClr val="accent1"/>
+          </a:effectRef>
+          <a:fontRef idx="minor">
+            <a:schemeClr val="lt1"/>
+          </a:fontRef>
+        </p:style>
+        <p:txBody>
+          <a:bodyPr rtlCol="0" anchor="ctr"/>
+          <a:lstStyle/>
+          <a:p>
+            <a:pPr algn="ctr"/>
+            <a:endParaRPr lang="en-US"/>
+          </a:p>
+        </p:txBody>
+      </p:sp>
+      <p:sp>
+        <p:nvSpPr>
+          <p:cNvPr id="7" name="Rounded Rectangle 6">
+            <a:extLst>
+              <a:ext uri="{FF2B5EF4-FFF2-40B4-BE49-F238E27FC236}">
+                <a16:creationId xmlns:a16="http://schemas.microsoft.com/office/drawing/2014/main" id="{17CFD8EC-DAD6-2D70-BC4C-CA8D499F942E}"/>
+              </a:ext>
+            </a:extLst>
+          </p:cNvPr>
+          <p:cNvSpPr/>
+          <p:nvPr/>
+        </p:nvSpPr>
+        <p:spPr>
+          <a:xfrm>
+            <a:off x="6612128" y="3291829"/>
+            <a:ext cx="4547616" cy="2818177"/>
+          </a:xfrm>
+          <a:prstGeom prst="roundRect">
+            <a:avLst>
+              <a:gd name="adj" fmla="val 8522"/>
+            </a:avLst>
+          </a:prstGeom>
+          <a:noFill/>
+          <a:ln w="57150">
+            <a:solidFill>
+              <a:schemeClr val="accent2"/>
+            </a:solidFill>
+          </a:ln>
+        </p:spPr>
+        <p:style>
+          <a:lnRef idx="2">
+            <a:schemeClr val="accent1">
+              <a:shade val="15000"/>
+            </a:schemeClr>
+          </a:lnRef>
+          <a:fillRef idx="1">
+            <a:schemeClr val="accent1"/>
+          </a:fillRef>
+          <a:effectRef idx="0">
+            <a:schemeClr val="accent1"/>
+          </a:effectRef>
+          <a:fontRef idx="minor">
+            <a:schemeClr val="lt1"/>
+          </a:fontRef>
+        </p:style>
+        <p:txBody>
+          <a:bodyPr rtlCol="0" anchor="ctr"/>
+          <a:lstStyle/>
+          <a:p>
+            <a:pPr algn="ctr"/>
+            <a:endParaRPr lang="en-US"/>
+          </a:p>
+        </p:txBody>
+      </p:sp>
+    </p:spTree>
+    <p:extLst>
+      <p:ext uri="{BB962C8B-B14F-4D97-AF65-F5344CB8AC3E}">
+        <p14:creationId xmlns:p14="http://schemas.microsoft.com/office/powerpoint/2010/main" val="891335981"/>
+      </p:ext>
+    </p:extLst>
+  </p:cSld>
+  <p:clrMapOvr>
+    <a:masterClrMapping/>
+  </p:clrMapOvr>
+  <mc:AlternateContent xmlns:mc="http://schemas.openxmlformats.org/markup-compatibility/2006" xmlns:p159="http://schemas.microsoft.com/office/powerpoint/2015/09/main">
+    <mc:Choice Requires="p159">
+      <p:transition xmlns:p14="http://schemas.microsoft.com/office/powerpoint/2010/main" spd="slow" p14:dur="2000" advTm="10000">
+        <p159:morph option="byObject"/>
+      </p:transition>
+    </mc:Choice>
+    <mc:Fallback xmlns="">
+      <p:transition spd="slow" advTm="10000">
+        <p:fade/>
+      </p:transition>
+    </mc:Fallback>
+  </mc:AlternateContent>
+</p:sld>
+</file>
+
+<file path=ppt/slides/slide41.xml><?xml version="1.0" encoding="utf-8"?>
 <p:sld xmlns:a="http://schemas.openxmlformats.org/drawingml/2006/main" xmlns:r="http://schemas.openxmlformats.org/officeDocument/2006/relationships" xmlns:p="http://schemas.openxmlformats.org/presentationml/2006/main" show="0">
   <p:cSld>
     <p:spTree>
@@ -34377,7 +36595,7 @@
 </p:sld>
 </file>
 
-<file path=ppt/slides/slide41.xml><?xml version="1.0" encoding="utf-8"?>
+<file path=ppt/slides/slide42.xml><?xml version="1.0" encoding="utf-8"?>
 <p:sld xmlns:a="http://schemas.openxmlformats.org/drawingml/2006/main" xmlns:r="http://schemas.openxmlformats.org/officeDocument/2006/relationships" xmlns:p="http://schemas.openxmlformats.org/presentationml/2006/main" show="0">
   <p:cSld>
     <p:spTree>
@@ -36134,13 +38352,13 @@
           <p:nvPr/>
         </p:nvPicPr>
         <p:blipFill>
-          <a:blip r:embed="rId3">
+          <a:blip r:embed="rId5">
             <a:extLst>
               <a:ext uri="{28A0092B-C50C-407E-A947-70E740481C1C}">
                 <a14:useLocalDpi xmlns:a14="http://schemas.microsoft.com/office/drawing/2010/main" val="0"/>
               </a:ext>
               <a:ext uri="{96DAC541-7B7A-43D3-8B79-37D633B846F1}">
-                <asvg:svgBlip xmlns:asvg="http://schemas.microsoft.com/office/drawing/2016/SVG/main" r:embed="rId5"/>
+                <asvg:svgBlip xmlns:asvg="http://schemas.microsoft.com/office/drawing/2016/SVG/main" r:embed="rId6"/>
               </a:ext>
             </a:extLst>
           </a:blip>

</xml_diff>